<commit_message>
updated the size of the poster and added a pdf version
</commit_message>
<xml_diff>
--- a/Poster.pptx
+++ b/Poster.pptx
@@ -2,7 +2,7 @@
 <file path=ppt/presentation.xml><?xml version="1.0" encoding="utf-8"?>
 <p:presentation xmlns:a="http://schemas.openxmlformats.org/drawingml/2006/main" xmlns:r="http://schemas.openxmlformats.org/officeDocument/2006/relationships" xmlns:p="http://schemas.openxmlformats.org/presentationml/2006/main" saveSubsetFonts="1" autoCompressPictures="0">
   <p:sldMasterIdLst>
-    <p:sldMasterId id="2147483648" r:id="rId1"/>
+    <p:sldMasterId id="2147483660" r:id="rId1"/>
   </p:sldMasterIdLst>
   <p:notesMasterIdLst>
     <p:notesMasterId r:id="rId3"/>
@@ -10,14 +10,14 @@
   <p:sldIdLst>
     <p:sldId id="256" r:id="rId2"/>
   </p:sldIdLst>
-  <p:sldSz cx="12192000" cy="6858000"/>
+  <p:sldSz cx="51120675" cy="38520688"/>
   <p:notesSz cx="6858000" cy="9144000"/>
   <p:defaultTextStyle>
     <a:defPPr>
       <a:defRPr lang="en-US"/>
     </a:defPPr>
-    <a:lvl1pPr marL="0" algn="l" defTabSz="914400" rtl="0" eaLnBrk="1" latinLnBrk="0" hangingPunct="1">
-      <a:defRPr sz="1800" kern="1200">
+    <a:lvl1pPr marL="0" algn="l" defTabSz="4301655" rtl="0" eaLnBrk="1" latinLnBrk="0" hangingPunct="1">
+      <a:defRPr sz="8470" kern="1200">
         <a:solidFill>
           <a:schemeClr val="tx1"/>
         </a:solidFill>
@@ -26,8 +26,8 @@
         <a:cs typeface="+mn-cs"/>
       </a:defRPr>
     </a:lvl1pPr>
-    <a:lvl2pPr marL="457200" algn="l" defTabSz="914400" rtl="0" eaLnBrk="1" latinLnBrk="0" hangingPunct="1">
-      <a:defRPr sz="1800" kern="1200">
+    <a:lvl2pPr marL="2150828" algn="l" defTabSz="4301655" rtl="0" eaLnBrk="1" latinLnBrk="0" hangingPunct="1">
+      <a:defRPr sz="8470" kern="1200">
         <a:solidFill>
           <a:schemeClr val="tx1"/>
         </a:solidFill>
@@ -36,8 +36,8 @@
         <a:cs typeface="+mn-cs"/>
       </a:defRPr>
     </a:lvl2pPr>
-    <a:lvl3pPr marL="914400" algn="l" defTabSz="914400" rtl="0" eaLnBrk="1" latinLnBrk="0" hangingPunct="1">
-      <a:defRPr sz="1800" kern="1200">
+    <a:lvl3pPr marL="4301655" algn="l" defTabSz="4301655" rtl="0" eaLnBrk="1" latinLnBrk="0" hangingPunct="1">
+      <a:defRPr sz="8470" kern="1200">
         <a:solidFill>
           <a:schemeClr val="tx1"/>
         </a:solidFill>
@@ -46,8 +46,8 @@
         <a:cs typeface="+mn-cs"/>
       </a:defRPr>
     </a:lvl3pPr>
-    <a:lvl4pPr marL="1371600" algn="l" defTabSz="914400" rtl="0" eaLnBrk="1" latinLnBrk="0" hangingPunct="1">
-      <a:defRPr sz="1800" kern="1200">
+    <a:lvl4pPr marL="6452487" algn="l" defTabSz="4301655" rtl="0" eaLnBrk="1" latinLnBrk="0" hangingPunct="1">
+      <a:defRPr sz="8470" kern="1200">
         <a:solidFill>
           <a:schemeClr val="tx1"/>
         </a:solidFill>
@@ -56,8 +56,8 @@
         <a:cs typeface="+mn-cs"/>
       </a:defRPr>
     </a:lvl4pPr>
-    <a:lvl5pPr marL="1828800" algn="l" defTabSz="914400" rtl="0" eaLnBrk="1" latinLnBrk="0" hangingPunct="1">
-      <a:defRPr sz="1800" kern="1200">
+    <a:lvl5pPr marL="8603315" algn="l" defTabSz="4301655" rtl="0" eaLnBrk="1" latinLnBrk="0" hangingPunct="1">
+      <a:defRPr sz="8470" kern="1200">
         <a:solidFill>
           <a:schemeClr val="tx1"/>
         </a:solidFill>
@@ -66,8 +66,8 @@
         <a:cs typeface="+mn-cs"/>
       </a:defRPr>
     </a:lvl5pPr>
-    <a:lvl6pPr marL="2286000" algn="l" defTabSz="914400" rtl="0" eaLnBrk="1" latinLnBrk="0" hangingPunct="1">
-      <a:defRPr sz="1800" kern="1200">
+    <a:lvl6pPr marL="10754143" algn="l" defTabSz="4301655" rtl="0" eaLnBrk="1" latinLnBrk="0" hangingPunct="1">
+      <a:defRPr sz="8470" kern="1200">
         <a:solidFill>
           <a:schemeClr val="tx1"/>
         </a:solidFill>
@@ -76,8 +76,8 @@
         <a:cs typeface="+mn-cs"/>
       </a:defRPr>
     </a:lvl6pPr>
-    <a:lvl7pPr marL="2743200" algn="l" defTabSz="914400" rtl="0" eaLnBrk="1" latinLnBrk="0" hangingPunct="1">
-      <a:defRPr sz="1800" kern="1200">
+    <a:lvl7pPr marL="12904970" algn="l" defTabSz="4301655" rtl="0" eaLnBrk="1" latinLnBrk="0" hangingPunct="1">
+      <a:defRPr sz="8470" kern="1200">
         <a:solidFill>
           <a:schemeClr val="tx1"/>
         </a:solidFill>
@@ -86,8 +86,8 @@
         <a:cs typeface="+mn-cs"/>
       </a:defRPr>
     </a:lvl7pPr>
-    <a:lvl8pPr marL="3200400" algn="l" defTabSz="914400" rtl="0" eaLnBrk="1" latinLnBrk="0" hangingPunct="1">
-      <a:defRPr sz="1800" kern="1200">
+    <a:lvl8pPr marL="15055802" algn="l" defTabSz="4301655" rtl="0" eaLnBrk="1" latinLnBrk="0" hangingPunct="1">
+      <a:defRPr sz="8470" kern="1200">
         <a:solidFill>
           <a:schemeClr val="tx1"/>
         </a:solidFill>
@@ -96,8 +96,8 @@
         <a:cs typeface="+mn-cs"/>
       </a:defRPr>
     </a:lvl8pPr>
-    <a:lvl9pPr marL="3657600" algn="l" defTabSz="914400" rtl="0" eaLnBrk="1" latinLnBrk="0" hangingPunct="1">
-      <a:defRPr sz="1800" kern="1200">
+    <a:lvl9pPr marL="17206630" algn="l" defTabSz="4301655" rtl="0" eaLnBrk="1" latinLnBrk="0" hangingPunct="1">
+      <a:defRPr sz="8470" kern="1200">
         <a:solidFill>
           <a:schemeClr val="tx1"/>
         </a:solidFill>
@@ -110,17 +110,17 @@
   <p:extLst>
     <p:ext uri="{EFAFB233-063F-42B5-8137-9DF3F51BA10A}">
       <p15:sldGuideLst xmlns:p15="http://schemas.microsoft.com/office/powerpoint/2012/main">
-        <p15:guide id="1" orient="horz" pos="2160" userDrawn="1">
+        <p15:guide id="1" orient="horz" pos="12133" userDrawn="1">
           <p15:clr>
             <a:srgbClr val="A4A3A4"/>
           </p15:clr>
         </p15:guide>
-        <p15:guide id="2" pos="3613" userDrawn="1">
+        <p15:guide id="2" pos="15149" userDrawn="1">
           <p15:clr>
             <a:srgbClr val="A4A3A4"/>
           </p15:clr>
         </p15:guide>
-        <p15:guide id="3" pos="3940" userDrawn="1">
+        <p15:guide id="3" pos="16520" userDrawn="1">
           <p15:clr>
             <a:srgbClr val="A4A3A4"/>
           </p15:clr>
@@ -213,7 +213,7 @@
           <a:p>
             <a:fld id="{3C68AACD-46DD-D948-92C9-7A9AC02C1491}" type="datetimeFigureOut">
               <a:rPr lang="en-US" smtClean="0"/>
-              <a:t>3/9/17</a:t>
+              <a:t>3/13/17</a:t>
             </a:fld>
             <a:endParaRPr lang="en-US"/>
           </a:p>
@@ -231,8 +231,8 @@
         </p:nvSpPr>
         <p:spPr>
           <a:xfrm>
-            <a:off x="685800" y="1143000"/>
-            <a:ext cx="5486400" cy="3086100"/>
+            <a:off x="1381125" y="1143000"/>
+            <a:ext cx="4095750" cy="3086100"/>
           </a:xfrm>
           <a:prstGeom prst="rect">
             <a:avLst/>
@@ -387,8 +387,8 @@
   </p:cSld>
   <p:clrMap bg1="lt1" tx1="dk1" bg2="lt2" tx2="dk2" accent1="accent1" accent2="accent2" accent3="accent3" accent4="accent4" accent5="accent5" accent6="accent6" hlink="hlink" folHlink="folHlink"/>
   <p:notesStyle>
-    <a:lvl1pPr marL="0" algn="l" defTabSz="914400" rtl="0" eaLnBrk="1" latinLnBrk="0" hangingPunct="1">
-      <a:defRPr sz="1200" kern="1200">
+    <a:lvl1pPr marL="0" algn="l" defTabSz="4301655" rtl="0" eaLnBrk="1" latinLnBrk="0" hangingPunct="1">
+      <a:defRPr sz="5647" kern="1200">
         <a:solidFill>
           <a:schemeClr val="tx1"/>
         </a:solidFill>
@@ -397,8 +397,8 @@
         <a:cs typeface="+mn-cs"/>
       </a:defRPr>
     </a:lvl1pPr>
-    <a:lvl2pPr marL="457200" algn="l" defTabSz="914400" rtl="0" eaLnBrk="1" latinLnBrk="0" hangingPunct="1">
-      <a:defRPr sz="1200" kern="1200">
+    <a:lvl2pPr marL="2150828" algn="l" defTabSz="4301655" rtl="0" eaLnBrk="1" latinLnBrk="0" hangingPunct="1">
+      <a:defRPr sz="5647" kern="1200">
         <a:solidFill>
           <a:schemeClr val="tx1"/>
         </a:solidFill>
@@ -407,8 +407,8 @@
         <a:cs typeface="+mn-cs"/>
       </a:defRPr>
     </a:lvl2pPr>
-    <a:lvl3pPr marL="914400" algn="l" defTabSz="914400" rtl="0" eaLnBrk="1" latinLnBrk="0" hangingPunct="1">
-      <a:defRPr sz="1200" kern="1200">
+    <a:lvl3pPr marL="4301655" algn="l" defTabSz="4301655" rtl="0" eaLnBrk="1" latinLnBrk="0" hangingPunct="1">
+      <a:defRPr sz="5647" kern="1200">
         <a:solidFill>
           <a:schemeClr val="tx1"/>
         </a:solidFill>
@@ -417,8 +417,8 @@
         <a:cs typeface="+mn-cs"/>
       </a:defRPr>
     </a:lvl3pPr>
-    <a:lvl4pPr marL="1371600" algn="l" defTabSz="914400" rtl="0" eaLnBrk="1" latinLnBrk="0" hangingPunct="1">
-      <a:defRPr sz="1200" kern="1200">
+    <a:lvl4pPr marL="6452487" algn="l" defTabSz="4301655" rtl="0" eaLnBrk="1" latinLnBrk="0" hangingPunct="1">
+      <a:defRPr sz="5647" kern="1200">
         <a:solidFill>
           <a:schemeClr val="tx1"/>
         </a:solidFill>
@@ -427,8 +427,8 @@
         <a:cs typeface="+mn-cs"/>
       </a:defRPr>
     </a:lvl4pPr>
-    <a:lvl5pPr marL="1828800" algn="l" defTabSz="914400" rtl="0" eaLnBrk="1" latinLnBrk="0" hangingPunct="1">
-      <a:defRPr sz="1200" kern="1200">
+    <a:lvl5pPr marL="8603315" algn="l" defTabSz="4301655" rtl="0" eaLnBrk="1" latinLnBrk="0" hangingPunct="1">
+      <a:defRPr sz="5647" kern="1200">
         <a:solidFill>
           <a:schemeClr val="tx1"/>
         </a:solidFill>
@@ -437,8 +437,8 @@
         <a:cs typeface="+mn-cs"/>
       </a:defRPr>
     </a:lvl5pPr>
-    <a:lvl6pPr marL="2286000" algn="l" defTabSz="914400" rtl="0" eaLnBrk="1" latinLnBrk="0" hangingPunct="1">
-      <a:defRPr sz="1200" kern="1200">
+    <a:lvl6pPr marL="10754143" algn="l" defTabSz="4301655" rtl="0" eaLnBrk="1" latinLnBrk="0" hangingPunct="1">
+      <a:defRPr sz="5647" kern="1200">
         <a:solidFill>
           <a:schemeClr val="tx1"/>
         </a:solidFill>
@@ -447,8 +447,8 @@
         <a:cs typeface="+mn-cs"/>
       </a:defRPr>
     </a:lvl6pPr>
-    <a:lvl7pPr marL="2743200" algn="l" defTabSz="914400" rtl="0" eaLnBrk="1" latinLnBrk="0" hangingPunct="1">
-      <a:defRPr sz="1200" kern="1200">
+    <a:lvl7pPr marL="12904970" algn="l" defTabSz="4301655" rtl="0" eaLnBrk="1" latinLnBrk="0" hangingPunct="1">
+      <a:defRPr sz="5647" kern="1200">
         <a:solidFill>
           <a:schemeClr val="tx1"/>
         </a:solidFill>
@@ -457,8 +457,8 @@
         <a:cs typeface="+mn-cs"/>
       </a:defRPr>
     </a:lvl7pPr>
-    <a:lvl8pPr marL="3200400" algn="l" defTabSz="914400" rtl="0" eaLnBrk="1" latinLnBrk="0" hangingPunct="1">
-      <a:defRPr sz="1200" kern="1200">
+    <a:lvl8pPr marL="15055802" algn="l" defTabSz="4301655" rtl="0" eaLnBrk="1" latinLnBrk="0" hangingPunct="1">
+      <a:defRPr sz="5647" kern="1200">
         <a:solidFill>
           <a:schemeClr val="tx1"/>
         </a:solidFill>
@@ -467,8 +467,8 @@
         <a:cs typeface="+mn-cs"/>
       </a:defRPr>
     </a:lvl8pPr>
-    <a:lvl9pPr marL="3657600" algn="l" defTabSz="914400" rtl="0" eaLnBrk="1" latinLnBrk="0" hangingPunct="1">
-      <a:defRPr sz="1200" kern="1200">
+    <a:lvl9pPr marL="17206630" algn="l" defTabSz="4301655" rtl="0" eaLnBrk="1" latinLnBrk="0" hangingPunct="1">
+      <a:defRPr sz="5647" kern="1200">
         <a:solidFill>
           <a:schemeClr val="tx1"/>
         </a:solidFill>
@@ -508,7 +508,12 @@
             <p:ph type="sldImg"/>
           </p:nvPr>
         </p:nvSpPr>
-        <p:spPr/>
+        <p:spPr>
+          <a:xfrm>
+            <a:off x="1381125" y="1143000"/>
+            <a:ext cx="4095750" cy="3086100"/>
+          </a:xfrm>
+        </p:spPr>
       </p:sp>
       <p:sp>
         <p:nvSpPr>
@@ -594,15 +599,15 @@
         </p:nvSpPr>
         <p:spPr>
           <a:xfrm>
-            <a:off x="1524000" y="1122363"/>
-            <a:ext cx="9144000" cy="2387600"/>
+            <a:off x="3834051" y="6304199"/>
+            <a:ext cx="43452574" cy="13410906"/>
           </a:xfrm>
         </p:spPr>
         <p:txBody>
           <a:bodyPr anchor="b"/>
           <a:lstStyle>
             <a:lvl1pPr algn="ctr">
-              <a:defRPr sz="6000"/>
+              <a:defRPr sz="33544"/>
             </a:lvl1pPr>
           </a:lstStyle>
           <a:p>
@@ -610,7 +615,7 @@
               <a:rPr lang="en-US" smtClean="0"/>
               <a:t>Click to edit Master title style</a:t>
             </a:r>
-            <a:endParaRPr lang="en-US"/>
+            <a:endParaRPr lang="en-US" dirty="0"/>
           </a:p>
         </p:txBody>
       </p:sp>
@@ -626,8 +631,8 @@
         </p:nvSpPr>
         <p:spPr>
           <a:xfrm>
-            <a:off x="1524000" y="3602038"/>
-            <a:ext cx="9144000" cy="1655762"/>
+            <a:off x="6390085" y="20232281"/>
+            <a:ext cx="38340506" cy="9300247"/>
           </a:xfrm>
         </p:spPr>
         <p:txBody>
@@ -635,39 +640,39 @@
           <a:lstStyle>
             <a:lvl1pPr marL="0" indent="0" algn="ctr">
               <a:buNone/>
-              <a:defRPr sz="2400"/>
+              <a:defRPr sz="13417"/>
             </a:lvl1pPr>
-            <a:lvl2pPr marL="457200" indent="0" algn="ctr">
-              <a:buNone/>
-              <a:defRPr sz="2000"/>
+            <a:lvl2pPr marL="2556022" indent="0" algn="ctr">
+              <a:buNone/>
+              <a:defRPr sz="11181"/>
             </a:lvl2pPr>
-            <a:lvl3pPr marL="914400" indent="0" algn="ctr">
-              <a:buNone/>
-              <a:defRPr sz="1800"/>
+            <a:lvl3pPr marL="5112045" indent="0" algn="ctr">
+              <a:buNone/>
+              <a:defRPr sz="10063"/>
             </a:lvl3pPr>
-            <a:lvl4pPr marL="1371600" indent="0" algn="ctr">
-              <a:buNone/>
-              <a:defRPr sz="1600"/>
+            <a:lvl4pPr marL="7668067" indent="0" algn="ctr">
+              <a:buNone/>
+              <a:defRPr sz="8945"/>
             </a:lvl4pPr>
-            <a:lvl5pPr marL="1828800" indent="0" algn="ctr">
-              <a:buNone/>
-              <a:defRPr sz="1600"/>
+            <a:lvl5pPr marL="10224089" indent="0" algn="ctr">
+              <a:buNone/>
+              <a:defRPr sz="8945"/>
             </a:lvl5pPr>
-            <a:lvl6pPr marL="2286000" indent="0" algn="ctr">
-              <a:buNone/>
-              <a:defRPr sz="1600"/>
+            <a:lvl6pPr marL="12780112" indent="0" algn="ctr">
+              <a:buNone/>
+              <a:defRPr sz="8945"/>
             </a:lvl6pPr>
-            <a:lvl7pPr marL="2743200" indent="0" algn="ctr">
-              <a:buNone/>
-              <a:defRPr sz="1600"/>
+            <a:lvl7pPr marL="15336134" indent="0" algn="ctr">
+              <a:buNone/>
+              <a:defRPr sz="8945"/>
             </a:lvl7pPr>
-            <a:lvl8pPr marL="3200400" indent="0" algn="ctr">
-              <a:buNone/>
-              <a:defRPr sz="1600"/>
+            <a:lvl8pPr marL="17892156" indent="0" algn="ctr">
+              <a:buNone/>
+              <a:defRPr sz="8945"/>
             </a:lvl8pPr>
-            <a:lvl9pPr marL="3657600" indent="0" algn="ctr">
-              <a:buNone/>
-              <a:defRPr sz="1600"/>
+            <a:lvl9pPr marL="20448179" indent="0" algn="ctr">
+              <a:buNone/>
+              <a:defRPr sz="8945"/>
             </a:lvl9pPr>
           </a:lstStyle>
           <a:p>
@@ -675,7 +680,7 @@
               <a:rPr lang="en-US" smtClean="0"/>
               <a:t>Click to edit Master subtitle style</a:t>
             </a:r>
-            <a:endParaRPr lang="en-US"/>
+            <a:endParaRPr lang="en-US" dirty="0"/>
           </a:p>
         </p:txBody>
       </p:sp>
@@ -696,7 +701,7 @@
           <a:p>
             <a:fld id="{AEE6CD16-A7F0-7F48-B549-C1BC0367B119}" type="datetimeFigureOut">
               <a:rPr lang="en-US" smtClean="0"/>
-              <a:t>3/9/17</a:t>
+              <a:t>3/13/17</a:t>
             </a:fld>
             <a:endParaRPr lang="en-US"/>
           </a:p>
@@ -747,7 +752,7 @@
     </p:spTree>
     <p:extLst>
       <p:ext uri="{BB962C8B-B14F-4D97-AF65-F5344CB8AC3E}">
-        <p14:creationId xmlns:p14="http://schemas.microsoft.com/office/powerpoint/2010/main" val="1334381282"/>
+        <p14:creationId xmlns:p14="http://schemas.microsoft.com/office/powerpoint/2010/main" val="654309206"/>
       </p:ext>
     </p:extLst>
   </p:cSld>
@@ -793,7 +798,7 @@
               <a:rPr lang="en-US" smtClean="0"/>
               <a:t>Click to edit Master title style</a:t>
             </a:r>
-            <a:endParaRPr lang="en-US"/>
+            <a:endParaRPr lang="en-US" dirty="0"/>
           </a:p>
         </p:txBody>
       </p:sp>
@@ -845,7 +850,7 @@
               <a:rPr lang="en-US" smtClean="0"/>
               <a:t>Fifth level</a:t>
             </a:r>
-            <a:endParaRPr lang="en-US"/>
+            <a:endParaRPr lang="en-US" dirty="0"/>
           </a:p>
         </p:txBody>
       </p:sp>
@@ -866,7 +871,7 @@
           <a:p>
             <a:fld id="{AEE6CD16-A7F0-7F48-B549-C1BC0367B119}" type="datetimeFigureOut">
               <a:rPr lang="en-US" smtClean="0"/>
-              <a:t>3/9/17</a:t>
+              <a:t>3/13/17</a:t>
             </a:fld>
             <a:endParaRPr lang="en-US"/>
           </a:p>
@@ -917,7 +922,7 @@
     </p:spTree>
     <p:extLst>
       <p:ext uri="{BB962C8B-B14F-4D97-AF65-F5344CB8AC3E}">
-        <p14:creationId xmlns:p14="http://schemas.microsoft.com/office/powerpoint/2010/main" val="1433198655"/>
+        <p14:creationId xmlns:p14="http://schemas.microsoft.com/office/powerpoint/2010/main" val="2022086661"/>
       </p:ext>
     </p:extLst>
   </p:cSld>
@@ -956,8 +961,8 @@
         </p:nvSpPr>
         <p:spPr>
           <a:xfrm>
-            <a:off x="8724900" y="365125"/>
-            <a:ext cx="2628900" cy="5811838"/>
+            <a:off x="36583236" y="2050870"/>
+            <a:ext cx="11022896" cy="32644503"/>
           </a:xfrm>
         </p:spPr>
         <p:txBody>
@@ -968,7 +973,7 @@
               <a:rPr lang="en-US" smtClean="0"/>
               <a:t>Click to edit Master title style</a:t>
             </a:r>
-            <a:endParaRPr lang="en-US"/>
+            <a:endParaRPr lang="en-US" dirty="0"/>
           </a:p>
         </p:txBody>
       </p:sp>
@@ -984,8 +989,8 @@
         </p:nvSpPr>
         <p:spPr>
           <a:xfrm>
-            <a:off x="838200" y="365125"/>
-            <a:ext cx="7734300" cy="5811838"/>
+            <a:off x="3514549" y="2050870"/>
+            <a:ext cx="32429678" cy="32644503"/>
           </a:xfrm>
         </p:spPr>
         <p:txBody>
@@ -1025,7 +1030,7 @@
               <a:rPr lang="en-US" smtClean="0"/>
               <a:t>Fifth level</a:t>
             </a:r>
-            <a:endParaRPr lang="en-US"/>
+            <a:endParaRPr lang="en-US" dirty="0"/>
           </a:p>
         </p:txBody>
       </p:sp>
@@ -1046,7 +1051,7 @@
           <a:p>
             <a:fld id="{AEE6CD16-A7F0-7F48-B549-C1BC0367B119}" type="datetimeFigureOut">
               <a:rPr lang="en-US" smtClean="0"/>
-              <a:t>3/9/17</a:t>
+              <a:t>3/13/17</a:t>
             </a:fld>
             <a:endParaRPr lang="en-US"/>
           </a:p>
@@ -1097,7 +1102,7 @@
     </p:spTree>
     <p:extLst>
       <p:ext uri="{BB962C8B-B14F-4D97-AF65-F5344CB8AC3E}">
-        <p14:creationId xmlns:p14="http://schemas.microsoft.com/office/powerpoint/2010/main" val="1593209833"/>
+        <p14:creationId xmlns:p14="http://schemas.microsoft.com/office/powerpoint/2010/main" val="1281797652"/>
       </p:ext>
     </p:extLst>
   </p:cSld>
@@ -1143,7 +1148,7 @@
               <a:rPr lang="en-US" smtClean="0"/>
               <a:t>Click to edit Master title style</a:t>
             </a:r>
-            <a:endParaRPr lang="en-US"/>
+            <a:endParaRPr lang="en-US" dirty="0"/>
           </a:p>
         </p:txBody>
       </p:sp>
@@ -1195,7 +1200,7 @@
               <a:rPr lang="en-US" smtClean="0"/>
               <a:t>Fifth level</a:t>
             </a:r>
-            <a:endParaRPr lang="en-US"/>
+            <a:endParaRPr lang="en-US" dirty="0"/>
           </a:p>
         </p:txBody>
       </p:sp>
@@ -1216,7 +1221,7 @@
           <a:p>
             <a:fld id="{AEE6CD16-A7F0-7F48-B549-C1BC0367B119}" type="datetimeFigureOut">
               <a:rPr lang="en-US" smtClean="0"/>
-              <a:t>3/9/17</a:t>
+              <a:t>3/13/17</a:t>
             </a:fld>
             <a:endParaRPr lang="en-US"/>
           </a:p>
@@ -1267,7 +1272,7 @@
     </p:spTree>
     <p:extLst>
       <p:ext uri="{BB962C8B-B14F-4D97-AF65-F5344CB8AC3E}">
-        <p14:creationId xmlns:p14="http://schemas.microsoft.com/office/powerpoint/2010/main" val="1468582987"/>
+        <p14:creationId xmlns:p14="http://schemas.microsoft.com/office/powerpoint/2010/main" val="1858552602"/>
       </p:ext>
     </p:extLst>
   </p:cSld>
@@ -1306,15 +1311,15 @@
         </p:nvSpPr>
         <p:spPr>
           <a:xfrm>
-            <a:off x="831850" y="1709738"/>
-            <a:ext cx="10515600" cy="2852737"/>
+            <a:off x="3487924" y="9603433"/>
+            <a:ext cx="44091582" cy="16023533"/>
           </a:xfrm>
         </p:spPr>
         <p:txBody>
           <a:bodyPr anchor="b"/>
           <a:lstStyle>
             <a:lvl1pPr>
-              <a:defRPr sz="6000"/>
+              <a:defRPr sz="33544"/>
             </a:lvl1pPr>
           </a:lstStyle>
           <a:p>
@@ -1322,7 +1327,7 @@
               <a:rPr lang="en-US" smtClean="0"/>
               <a:t>Click to edit Master title style</a:t>
             </a:r>
-            <a:endParaRPr lang="en-US"/>
+            <a:endParaRPr lang="en-US" dirty="0"/>
           </a:p>
         </p:txBody>
       </p:sp>
@@ -1338,8 +1343,8 @@
         </p:nvSpPr>
         <p:spPr>
           <a:xfrm>
-            <a:off x="831850" y="4589463"/>
-            <a:ext cx="10515600" cy="1500187"/>
+            <a:off x="3487924" y="25778555"/>
+            <a:ext cx="44091582" cy="8426398"/>
           </a:xfrm>
         </p:spPr>
         <p:txBody>
@@ -1347,17 +1352,15 @@
           <a:lstStyle>
             <a:lvl1pPr marL="0" indent="0">
               <a:buNone/>
-              <a:defRPr sz="2400">
+              <a:defRPr sz="13417">
                 <a:solidFill>
-                  <a:schemeClr val="tx1">
-                    <a:tint val="75000"/>
-                  </a:schemeClr>
+                  <a:schemeClr val="tx1"/>
                 </a:solidFill>
               </a:defRPr>
             </a:lvl1pPr>
-            <a:lvl2pPr marL="457200" indent="0">
-              <a:buNone/>
-              <a:defRPr sz="2000">
+            <a:lvl2pPr marL="2556022" indent="0">
+              <a:buNone/>
+              <a:defRPr sz="11181">
                 <a:solidFill>
                   <a:schemeClr val="tx1">
                     <a:tint val="75000"/>
@@ -1365,9 +1368,9 @@
                 </a:solidFill>
               </a:defRPr>
             </a:lvl2pPr>
-            <a:lvl3pPr marL="914400" indent="0">
-              <a:buNone/>
-              <a:defRPr sz="1800">
+            <a:lvl3pPr marL="5112045" indent="0">
+              <a:buNone/>
+              <a:defRPr sz="10063">
                 <a:solidFill>
                   <a:schemeClr val="tx1">
                     <a:tint val="75000"/>
@@ -1375,9 +1378,9 @@
                 </a:solidFill>
               </a:defRPr>
             </a:lvl3pPr>
-            <a:lvl4pPr marL="1371600" indent="0">
-              <a:buNone/>
-              <a:defRPr sz="1600">
+            <a:lvl4pPr marL="7668067" indent="0">
+              <a:buNone/>
+              <a:defRPr sz="8945">
                 <a:solidFill>
                   <a:schemeClr val="tx1">
                     <a:tint val="75000"/>
@@ -1385,9 +1388,9 @@
                 </a:solidFill>
               </a:defRPr>
             </a:lvl4pPr>
-            <a:lvl5pPr marL="1828800" indent="0">
-              <a:buNone/>
-              <a:defRPr sz="1600">
+            <a:lvl5pPr marL="10224089" indent="0">
+              <a:buNone/>
+              <a:defRPr sz="8945">
                 <a:solidFill>
                   <a:schemeClr val="tx1">
                     <a:tint val="75000"/>
@@ -1395,9 +1398,9 @@
                 </a:solidFill>
               </a:defRPr>
             </a:lvl5pPr>
-            <a:lvl6pPr marL="2286000" indent="0">
-              <a:buNone/>
-              <a:defRPr sz="1600">
+            <a:lvl6pPr marL="12780112" indent="0">
+              <a:buNone/>
+              <a:defRPr sz="8945">
                 <a:solidFill>
                   <a:schemeClr val="tx1">
                     <a:tint val="75000"/>
@@ -1405,9 +1408,9 @@
                 </a:solidFill>
               </a:defRPr>
             </a:lvl6pPr>
-            <a:lvl7pPr marL="2743200" indent="0">
-              <a:buNone/>
-              <a:defRPr sz="1600">
+            <a:lvl7pPr marL="15336134" indent="0">
+              <a:buNone/>
+              <a:defRPr sz="8945">
                 <a:solidFill>
                   <a:schemeClr val="tx1">
                     <a:tint val="75000"/>
@@ -1415,9 +1418,9 @@
                 </a:solidFill>
               </a:defRPr>
             </a:lvl7pPr>
-            <a:lvl8pPr marL="3200400" indent="0">
-              <a:buNone/>
-              <a:defRPr sz="1600">
+            <a:lvl8pPr marL="17892156" indent="0">
+              <a:buNone/>
+              <a:defRPr sz="8945">
                 <a:solidFill>
                   <a:schemeClr val="tx1">
                     <a:tint val="75000"/>
@@ -1425,9 +1428,9 @@
                 </a:solidFill>
               </a:defRPr>
             </a:lvl8pPr>
-            <a:lvl9pPr marL="3657600" indent="0">
-              <a:buNone/>
-              <a:defRPr sz="1600">
+            <a:lvl9pPr marL="20448179" indent="0">
+              <a:buNone/>
+              <a:defRPr sz="8945">
                 <a:solidFill>
                   <a:schemeClr val="tx1">
                     <a:tint val="75000"/>
@@ -1462,7 +1465,7 @@
           <a:p>
             <a:fld id="{AEE6CD16-A7F0-7F48-B549-C1BC0367B119}" type="datetimeFigureOut">
               <a:rPr lang="en-US" smtClean="0"/>
-              <a:t>3/9/17</a:t>
+              <a:t>3/13/17</a:t>
             </a:fld>
             <a:endParaRPr lang="en-US"/>
           </a:p>
@@ -1513,7 +1516,7 @@
     </p:spTree>
     <p:extLst>
       <p:ext uri="{BB962C8B-B14F-4D97-AF65-F5344CB8AC3E}">
-        <p14:creationId xmlns:p14="http://schemas.microsoft.com/office/powerpoint/2010/main" val="1444707538"/>
+        <p14:creationId xmlns:p14="http://schemas.microsoft.com/office/powerpoint/2010/main" val="1543936199"/>
       </p:ext>
     </p:extLst>
   </p:cSld>
@@ -1559,7 +1562,7 @@
               <a:rPr lang="en-US" smtClean="0"/>
               <a:t>Click to edit Master title style</a:t>
             </a:r>
-            <a:endParaRPr lang="en-US"/>
+            <a:endParaRPr lang="en-US" dirty="0"/>
           </a:p>
         </p:txBody>
       </p:sp>
@@ -1575,8 +1578,8 @@
         </p:nvSpPr>
         <p:spPr>
           <a:xfrm>
-            <a:off x="838200" y="1825625"/>
-            <a:ext cx="5181600" cy="4351338"/>
+            <a:off x="3514546" y="10254350"/>
+            <a:ext cx="21726287" cy="24441023"/>
           </a:xfrm>
         </p:spPr>
         <p:txBody>
@@ -1616,7 +1619,7 @@
               <a:rPr lang="en-US" smtClean="0"/>
               <a:t>Fifth level</a:t>
             </a:r>
-            <a:endParaRPr lang="en-US"/>
+            <a:endParaRPr lang="en-US" dirty="0"/>
           </a:p>
         </p:txBody>
       </p:sp>
@@ -1632,8 +1635,8 @@
         </p:nvSpPr>
         <p:spPr>
           <a:xfrm>
-            <a:off x="6172200" y="1825625"/>
-            <a:ext cx="5181600" cy="4351338"/>
+            <a:off x="25879842" y="10254350"/>
+            <a:ext cx="21726287" cy="24441023"/>
           </a:xfrm>
         </p:spPr>
         <p:txBody>
@@ -1673,7 +1676,7 @@
               <a:rPr lang="en-US" smtClean="0"/>
               <a:t>Fifth level</a:t>
             </a:r>
-            <a:endParaRPr lang="en-US"/>
+            <a:endParaRPr lang="en-US" dirty="0"/>
           </a:p>
         </p:txBody>
       </p:sp>
@@ -1694,7 +1697,7 @@
           <a:p>
             <a:fld id="{AEE6CD16-A7F0-7F48-B549-C1BC0367B119}" type="datetimeFigureOut">
               <a:rPr lang="en-US" smtClean="0"/>
-              <a:t>3/9/17</a:t>
+              <a:t>3/13/17</a:t>
             </a:fld>
             <a:endParaRPr lang="en-US"/>
           </a:p>
@@ -1745,7 +1748,7 @@
     </p:spTree>
     <p:extLst>
       <p:ext uri="{BB962C8B-B14F-4D97-AF65-F5344CB8AC3E}">
-        <p14:creationId xmlns:p14="http://schemas.microsoft.com/office/powerpoint/2010/main" val="1749478184"/>
+        <p14:creationId xmlns:p14="http://schemas.microsoft.com/office/powerpoint/2010/main" val="890789892"/>
       </p:ext>
     </p:extLst>
   </p:cSld>
@@ -1784,8 +1787,8 @@
         </p:nvSpPr>
         <p:spPr>
           <a:xfrm>
-            <a:off x="839788" y="365125"/>
-            <a:ext cx="10515600" cy="1325563"/>
+            <a:off x="3521205" y="2050879"/>
+            <a:ext cx="44091582" cy="7445552"/>
           </a:xfrm>
         </p:spPr>
         <p:txBody>
@@ -1796,7 +1799,7 @@
               <a:rPr lang="en-US" smtClean="0"/>
               <a:t>Click to edit Master title style</a:t>
             </a:r>
-            <a:endParaRPr lang="en-US"/>
+            <a:endParaRPr lang="en-US" dirty="0"/>
           </a:p>
         </p:txBody>
       </p:sp>
@@ -1812,8 +1815,8 @@
         </p:nvSpPr>
         <p:spPr>
           <a:xfrm>
-            <a:off x="839788" y="1681163"/>
-            <a:ext cx="5157787" cy="823912"/>
+            <a:off x="3521211" y="9442921"/>
+            <a:ext cx="21626438" cy="4627830"/>
           </a:xfrm>
         </p:spPr>
         <p:txBody>
@@ -1821,39 +1824,39 @@
           <a:lstStyle>
             <a:lvl1pPr marL="0" indent="0">
               <a:buNone/>
-              <a:defRPr sz="2400" b="1"/>
+              <a:defRPr sz="13417" b="1"/>
             </a:lvl1pPr>
-            <a:lvl2pPr marL="457200" indent="0">
-              <a:buNone/>
-              <a:defRPr sz="2000" b="1"/>
+            <a:lvl2pPr marL="2556022" indent="0">
+              <a:buNone/>
+              <a:defRPr sz="11181" b="1"/>
             </a:lvl2pPr>
-            <a:lvl3pPr marL="914400" indent="0">
-              <a:buNone/>
-              <a:defRPr sz="1800" b="1"/>
+            <a:lvl3pPr marL="5112045" indent="0">
+              <a:buNone/>
+              <a:defRPr sz="10063" b="1"/>
             </a:lvl3pPr>
-            <a:lvl4pPr marL="1371600" indent="0">
-              <a:buNone/>
-              <a:defRPr sz="1600" b="1"/>
+            <a:lvl4pPr marL="7668067" indent="0">
+              <a:buNone/>
+              <a:defRPr sz="8945" b="1"/>
             </a:lvl4pPr>
-            <a:lvl5pPr marL="1828800" indent="0">
-              <a:buNone/>
-              <a:defRPr sz="1600" b="1"/>
+            <a:lvl5pPr marL="10224089" indent="0">
+              <a:buNone/>
+              <a:defRPr sz="8945" b="1"/>
             </a:lvl5pPr>
-            <a:lvl6pPr marL="2286000" indent="0">
-              <a:buNone/>
-              <a:defRPr sz="1600" b="1"/>
+            <a:lvl6pPr marL="12780112" indent="0">
+              <a:buNone/>
+              <a:defRPr sz="8945" b="1"/>
             </a:lvl6pPr>
-            <a:lvl7pPr marL="2743200" indent="0">
-              <a:buNone/>
-              <a:defRPr sz="1600" b="1"/>
+            <a:lvl7pPr marL="15336134" indent="0">
+              <a:buNone/>
+              <a:defRPr sz="8945" b="1"/>
             </a:lvl7pPr>
-            <a:lvl8pPr marL="3200400" indent="0">
-              <a:buNone/>
-              <a:defRPr sz="1600" b="1"/>
+            <a:lvl8pPr marL="17892156" indent="0">
+              <a:buNone/>
+              <a:defRPr sz="8945" b="1"/>
             </a:lvl8pPr>
-            <a:lvl9pPr marL="3657600" indent="0">
-              <a:buNone/>
-              <a:defRPr sz="1600" b="1"/>
+            <a:lvl9pPr marL="20448179" indent="0">
+              <a:buNone/>
+              <a:defRPr sz="8945" b="1"/>
             </a:lvl9pPr>
           </a:lstStyle>
           <a:p>
@@ -1877,8 +1880,8 @@
         </p:nvSpPr>
         <p:spPr>
           <a:xfrm>
-            <a:off x="839788" y="2505075"/>
-            <a:ext cx="5157787" cy="3684588"/>
+            <a:off x="3521211" y="14070751"/>
+            <a:ext cx="21626438" cy="20695956"/>
           </a:xfrm>
         </p:spPr>
         <p:txBody>
@@ -1918,7 +1921,7 @@
               <a:rPr lang="en-US" smtClean="0"/>
               <a:t>Fifth level</a:t>
             </a:r>
-            <a:endParaRPr lang="en-US"/>
+            <a:endParaRPr lang="en-US" dirty="0"/>
           </a:p>
         </p:txBody>
       </p:sp>
@@ -1934,8 +1937,8 @@
         </p:nvSpPr>
         <p:spPr>
           <a:xfrm>
-            <a:off x="6172200" y="1681163"/>
-            <a:ext cx="5183188" cy="823912"/>
+            <a:off x="25879845" y="9442921"/>
+            <a:ext cx="21732945" cy="4627830"/>
           </a:xfrm>
         </p:spPr>
         <p:txBody>
@@ -1943,39 +1946,39 @@
           <a:lstStyle>
             <a:lvl1pPr marL="0" indent="0">
               <a:buNone/>
-              <a:defRPr sz="2400" b="1"/>
+              <a:defRPr sz="13417" b="1"/>
             </a:lvl1pPr>
-            <a:lvl2pPr marL="457200" indent="0">
-              <a:buNone/>
-              <a:defRPr sz="2000" b="1"/>
+            <a:lvl2pPr marL="2556022" indent="0">
+              <a:buNone/>
+              <a:defRPr sz="11181" b="1"/>
             </a:lvl2pPr>
-            <a:lvl3pPr marL="914400" indent="0">
-              <a:buNone/>
-              <a:defRPr sz="1800" b="1"/>
+            <a:lvl3pPr marL="5112045" indent="0">
+              <a:buNone/>
+              <a:defRPr sz="10063" b="1"/>
             </a:lvl3pPr>
-            <a:lvl4pPr marL="1371600" indent="0">
-              <a:buNone/>
-              <a:defRPr sz="1600" b="1"/>
+            <a:lvl4pPr marL="7668067" indent="0">
+              <a:buNone/>
+              <a:defRPr sz="8945" b="1"/>
             </a:lvl4pPr>
-            <a:lvl5pPr marL="1828800" indent="0">
-              <a:buNone/>
-              <a:defRPr sz="1600" b="1"/>
+            <a:lvl5pPr marL="10224089" indent="0">
+              <a:buNone/>
+              <a:defRPr sz="8945" b="1"/>
             </a:lvl5pPr>
-            <a:lvl6pPr marL="2286000" indent="0">
-              <a:buNone/>
-              <a:defRPr sz="1600" b="1"/>
+            <a:lvl6pPr marL="12780112" indent="0">
+              <a:buNone/>
+              <a:defRPr sz="8945" b="1"/>
             </a:lvl6pPr>
-            <a:lvl7pPr marL="2743200" indent="0">
-              <a:buNone/>
-              <a:defRPr sz="1600" b="1"/>
+            <a:lvl7pPr marL="15336134" indent="0">
+              <a:buNone/>
+              <a:defRPr sz="8945" b="1"/>
             </a:lvl7pPr>
-            <a:lvl8pPr marL="3200400" indent="0">
-              <a:buNone/>
-              <a:defRPr sz="1600" b="1"/>
+            <a:lvl8pPr marL="17892156" indent="0">
+              <a:buNone/>
+              <a:defRPr sz="8945" b="1"/>
             </a:lvl8pPr>
-            <a:lvl9pPr marL="3657600" indent="0">
-              <a:buNone/>
-              <a:defRPr sz="1600" b="1"/>
+            <a:lvl9pPr marL="20448179" indent="0">
+              <a:buNone/>
+              <a:defRPr sz="8945" b="1"/>
             </a:lvl9pPr>
           </a:lstStyle>
           <a:p>
@@ -1999,8 +2002,8 @@
         </p:nvSpPr>
         <p:spPr>
           <a:xfrm>
-            <a:off x="6172200" y="2505075"/>
-            <a:ext cx="5183188" cy="3684588"/>
+            <a:off x="25879845" y="14070751"/>
+            <a:ext cx="21732945" cy="20695956"/>
           </a:xfrm>
         </p:spPr>
         <p:txBody>
@@ -2040,7 +2043,7 @@
               <a:rPr lang="en-US" smtClean="0"/>
               <a:t>Fifth level</a:t>
             </a:r>
-            <a:endParaRPr lang="en-US"/>
+            <a:endParaRPr lang="en-US" dirty="0"/>
           </a:p>
         </p:txBody>
       </p:sp>
@@ -2061,7 +2064,7 @@
           <a:p>
             <a:fld id="{AEE6CD16-A7F0-7F48-B549-C1BC0367B119}" type="datetimeFigureOut">
               <a:rPr lang="en-US" smtClean="0"/>
-              <a:t>3/9/17</a:t>
+              <a:t>3/13/17</a:t>
             </a:fld>
             <a:endParaRPr lang="en-US"/>
           </a:p>
@@ -2112,7 +2115,7 @@
     </p:spTree>
     <p:extLst>
       <p:ext uri="{BB962C8B-B14F-4D97-AF65-F5344CB8AC3E}">
-        <p14:creationId xmlns:p14="http://schemas.microsoft.com/office/powerpoint/2010/main" val="133743764"/>
+        <p14:creationId xmlns:p14="http://schemas.microsoft.com/office/powerpoint/2010/main" val="1397211607"/>
       </p:ext>
     </p:extLst>
   </p:cSld>
@@ -2158,7 +2161,7 @@
               <a:rPr lang="en-US" smtClean="0"/>
               <a:t>Click to edit Master title style</a:t>
             </a:r>
-            <a:endParaRPr lang="en-US"/>
+            <a:endParaRPr lang="en-US" dirty="0"/>
           </a:p>
         </p:txBody>
       </p:sp>
@@ -2179,7 +2182,7 @@
           <a:p>
             <a:fld id="{AEE6CD16-A7F0-7F48-B549-C1BC0367B119}" type="datetimeFigureOut">
               <a:rPr lang="en-US" smtClean="0"/>
-              <a:t>3/9/17</a:t>
+              <a:t>3/13/17</a:t>
             </a:fld>
             <a:endParaRPr lang="en-US"/>
           </a:p>
@@ -2230,7 +2233,7 @@
     </p:spTree>
     <p:extLst>
       <p:ext uri="{BB962C8B-B14F-4D97-AF65-F5344CB8AC3E}">
-        <p14:creationId xmlns:p14="http://schemas.microsoft.com/office/powerpoint/2010/main" val="1563546786"/>
+        <p14:creationId xmlns:p14="http://schemas.microsoft.com/office/powerpoint/2010/main" val="201798904"/>
       </p:ext>
     </p:extLst>
   </p:cSld>
@@ -2274,7 +2277,7 @@
           <a:p>
             <a:fld id="{AEE6CD16-A7F0-7F48-B549-C1BC0367B119}" type="datetimeFigureOut">
               <a:rPr lang="en-US" smtClean="0"/>
-              <a:t>3/9/17</a:t>
+              <a:t>3/13/17</a:t>
             </a:fld>
             <a:endParaRPr lang="en-US"/>
           </a:p>
@@ -2325,7 +2328,7 @@
     </p:spTree>
     <p:extLst>
       <p:ext uri="{BB962C8B-B14F-4D97-AF65-F5344CB8AC3E}">
-        <p14:creationId xmlns:p14="http://schemas.microsoft.com/office/powerpoint/2010/main" val="1920927610"/>
+        <p14:creationId xmlns:p14="http://schemas.microsoft.com/office/powerpoint/2010/main" val="757500915"/>
       </p:ext>
     </p:extLst>
   </p:cSld>
@@ -2364,15 +2367,15 @@
         </p:nvSpPr>
         <p:spPr>
           <a:xfrm>
-            <a:off x="839788" y="457200"/>
-            <a:ext cx="3932237" cy="1600200"/>
+            <a:off x="3521205" y="2568046"/>
+            <a:ext cx="16487748" cy="8988161"/>
           </a:xfrm>
         </p:spPr>
         <p:txBody>
           <a:bodyPr anchor="b"/>
           <a:lstStyle>
             <a:lvl1pPr>
-              <a:defRPr sz="3200"/>
+              <a:defRPr sz="17890"/>
             </a:lvl1pPr>
           </a:lstStyle>
           <a:p>
@@ -2380,7 +2383,7 @@
               <a:rPr lang="en-US" smtClean="0"/>
               <a:t>Click to edit Master title style</a:t>
             </a:r>
-            <a:endParaRPr lang="en-US"/>
+            <a:endParaRPr lang="en-US" dirty="0"/>
           </a:p>
         </p:txBody>
       </p:sp>
@@ -2396,39 +2399,39 @@
         </p:nvSpPr>
         <p:spPr>
           <a:xfrm>
-            <a:off x="5183188" y="987425"/>
-            <a:ext cx="6172200" cy="4873625"/>
+            <a:off x="21732945" y="5546274"/>
+            <a:ext cx="25879842" cy="27374656"/>
           </a:xfrm>
         </p:spPr>
         <p:txBody>
           <a:bodyPr/>
           <a:lstStyle>
             <a:lvl1pPr>
-              <a:defRPr sz="3200"/>
+              <a:defRPr sz="17890"/>
             </a:lvl1pPr>
             <a:lvl2pPr>
-              <a:defRPr sz="2800"/>
+              <a:defRPr sz="15654"/>
             </a:lvl2pPr>
             <a:lvl3pPr>
-              <a:defRPr sz="2400"/>
+              <a:defRPr sz="13417"/>
             </a:lvl3pPr>
             <a:lvl4pPr>
-              <a:defRPr sz="2000"/>
+              <a:defRPr sz="11181"/>
             </a:lvl4pPr>
             <a:lvl5pPr>
-              <a:defRPr sz="2000"/>
+              <a:defRPr sz="11181"/>
             </a:lvl5pPr>
             <a:lvl6pPr>
-              <a:defRPr sz="2000"/>
+              <a:defRPr sz="11181"/>
             </a:lvl6pPr>
             <a:lvl7pPr>
-              <a:defRPr sz="2000"/>
+              <a:defRPr sz="11181"/>
             </a:lvl7pPr>
             <a:lvl8pPr>
-              <a:defRPr sz="2000"/>
+              <a:defRPr sz="11181"/>
             </a:lvl8pPr>
             <a:lvl9pPr>
-              <a:defRPr sz="2000"/>
+              <a:defRPr sz="11181"/>
             </a:lvl9pPr>
           </a:lstStyle>
           <a:p>
@@ -2465,7 +2468,7 @@
               <a:rPr lang="en-US" smtClean="0"/>
               <a:t>Fifth level</a:t>
             </a:r>
-            <a:endParaRPr lang="en-US"/>
+            <a:endParaRPr lang="en-US" dirty="0"/>
           </a:p>
         </p:txBody>
       </p:sp>
@@ -2481,8 +2484,8 @@
         </p:nvSpPr>
         <p:spPr>
           <a:xfrm>
-            <a:off x="839788" y="2057400"/>
-            <a:ext cx="3932237" cy="3811588"/>
+            <a:off x="3521205" y="11556206"/>
+            <a:ext cx="16487748" cy="21409302"/>
           </a:xfrm>
         </p:spPr>
         <p:txBody>
@@ -2490,39 +2493,39 @@
           <a:lstStyle>
             <a:lvl1pPr marL="0" indent="0">
               <a:buNone/>
-              <a:defRPr sz="1600"/>
+              <a:defRPr sz="8945"/>
             </a:lvl1pPr>
-            <a:lvl2pPr marL="457200" indent="0">
-              <a:buNone/>
-              <a:defRPr sz="1400"/>
+            <a:lvl2pPr marL="2556022" indent="0">
+              <a:buNone/>
+              <a:defRPr sz="7827"/>
             </a:lvl2pPr>
-            <a:lvl3pPr marL="914400" indent="0">
-              <a:buNone/>
-              <a:defRPr sz="1200"/>
+            <a:lvl3pPr marL="5112045" indent="0">
+              <a:buNone/>
+              <a:defRPr sz="6709"/>
             </a:lvl3pPr>
-            <a:lvl4pPr marL="1371600" indent="0">
-              <a:buNone/>
-              <a:defRPr sz="1000"/>
+            <a:lvl4pPr marL="7668067" indent="0">
+              <a:buNone/>
+              <a:defRPr sz="5591"/>
             </a:lvl4pPr>
-            <a:lvl5pPr marL="1828800" indent="0">
-              <a:buNone/>
-              <a:defRPr sz="1000"/>
+            <a:lvl5pPr marL="10224089" indent="0">
+              <a:buNone/>
+              <a:defRPr sz="5591"/>
             </a:lvl5pPr>
-            <a:lvl6pPr marL="2286000" indent="0">
-              <a:buNone/>
-              <a:defRPr sz="1000"/>
+            <a:lvl6pPr marL="12780112" indent="0">
+              <a:buNone/>
+              <a:defRPr sz="5591"/>
             </a:lvl6pPr>
-            <a:lvl7pPr marL="2743200" indent="0">
-              <a:buNone/>
-              <a:defRPr sz="1000"/>
+            <a:lvl7pPr marL="15336134" indent="0">
+              <a:buNone/>
+              <a:defRPr sz="5591"/>
             </a:lvl7pPr>
-            <a:lvl8pPr marL="3200400" indent="0">
-              <a:buNone/>
-              <a:defRPr sz="1000"/>
+            <a:lvl8pPr marL="17892156" indent="0">
+              <a:buNone/>
+              <a:defRPr sz="5591"/>
             </a:lvl8pPr>
-            <a:lvl9pPr marL="3657600" indent="0">
-              <a:buNone/>
-              <a:defRPr sz="1000"/>
+            <a:lvl9pPr marL="20448179" indent="0">
+              <a:buNone/>
+              <a:defRPr sz="5591"/>
             </a:lvl9pPr>
           </a:lstStyle>
           <a:p>
@@ -2551,7 +2554,7 @@
           <a:p>
             <a:fld id="{AEE6CD16-A7F0-7F48-B549-C1BC0367B119}" type="datetimeFigureOut">
               <a:rPr lang="en-US" smtClean="0"/>
-              <a:t>3/9/17</a:t>
+              <a:t>3/13/17</a:t>
             </a:fld>
             <a:endParaRPr lang="en-US"/>
           </a:p>
@@ -2602,7 +2605,7 @@
     </p:spTree>
     <p:extLst>
       <p:ext uri="{BB962C8B-B14F-4D97-AF65-F5344CB8AC3E}">
-        <p14:creationId xmlns:p14="http://schemas.microsoft.com/office/powerpoint/2010/main" val="1908675919"/>
+        <p14:creationId xmlns:p14="http://schemas.microsoft.com/office/powerpoint/2010/main" val="1034818989"/>
       </p:ext>
     </p:extLst>
   </p:cSld>
@@ -2641,15 +2644,15 @@
         </p:nvSpPr>
         <p:spPr>
           <a:xfrm>
-            <a:off x="839788" y="457200"/>
-            <a:ext cx="3932237" cy="1600200"/>
+            <a:off x="3521205" y="2568046"/>
+            <a:ext cx="16487748" cy="8988161"/>
           </a:xfrm>
         </p:spPr>
         <p:txBody>
           <a:bodyPr anchor="b"/>
           <a:lstStyle>
             <a:lvl1pPr>
-              <a:defRPr sz="3200"/>
+              <a:defRPr sz="17890"/>
             </a:lvl1pPr>
           </a:lstStyle>
           <a:p>
@@ -2657,7 +2660,7 @@
               <a:rPr lang="en-US" smtClean="0"/>
               <a:t>Click to edit Master title style</a:t>
             </a:r>
-            <a:endParaRPr lang="en-US"/>
+            <a:endParaRPr lang="en-US" dirty="0"/>
           </a:p>
         </p:txBody>
       </p:sp>
@@ -2665,7 +2668,7 @@
         <p:nvSpPr>
           <p:cNvPr id="3" name="Picture Placeholder 2"/>
           <p:cNvSpPr>
-            <a:spLocks noGrp="1"/>
+            <a:spLocks noGrp="1" noChangeAspect="1"/>
           </p:cNvSpPr>
           <p:nvPr>
             <p:ph type="pic" idx="1"/>
@@ -2673,8 +2676,73 @@
         </p:nvSpPr>
         <p:spPr>
           <a:xfrm>
-            <a:off x="5183188" y="987425"/>
-            <a:ext cx="6172200" cy="4873625"/>
+            <a:off x="21732945" y="5546274"/>
+            <a:ext cx="25879842" cy="27374656"/>
+          </a:xfrm>
+        </p:spPr>
+        <p:txBody>
+          <a:bodyPr anchor="t"/>
+          <a:lstStyle>
+            <a:lvl1pPr marL="0" indent="0">
+              <a:buNone/>
+              <a:defRPr sz="17890"/>
+            </a:lvl1pPr>
+            <a:lvl2pPr marL="2556022" indent="0">
+              <a:buNone/>
+              <a:defRPr sz="15654"/>
+            </a:lvl2pPr>
+            <a:lvl3pPr marL="5112045" indent="0">
+              <a:buNone/>
+              <a:defRPr sz="13417"/>
+            </a:lvl3pPr>
+            <a:lvl4pPr marL="7668067" indent="0">
+              <a:buNone/>
+              <a:defRPr sz="11181"/>
+            </a:lvl4pPr>
+            <a:lvl5pPr marL="10224089" indent="0">
+              <a:buNone/>
+              <a:defRPr sz="11181"/>
+            </a:lvl5pPr>
+            <a:lvl6pPr marL="12780112" indent="0">
+              <a:buNone/>
+              <a:defRPr sz="11181"/>
+            </a:lvl6pPr>
+            <a:lvl7pPr marL="15336134" indent="0">
+              <a:buNone/>
+              <a:defRPr sz="11181"/>
+            </a:lvl7pPr>
+            <a:lvl8pPr marL="17892156" indent="0">
+              <a:buNone/>
+              <a:defRPr sz="11181"/>
+            </a:lvl8pPr>
+            <a:lvl9pPr marL="20448179" indent="0">
+              <a:buNone/>
+              <a:defRPr sz="11181"/>
+            </a:lvl9pPr>
+          </a:lstStyle>
+          <a:p>
+            <a:r>
+              <a:rPr lang="en-US" smtClean="0"/>
+              <a:t>Drag picture to placeholder or click icon to add</a:t>
+            </a:r>
+            <a:endParaRPr lang="en-US" dirty="0"/>
+          </a:p>
+        </p:txBody>
+      </p:sp>
+      <p:sp>
+        <p:nvSpPr>
+          <p:cNvPr id="4" name="Text Placeholder 3"/>
+          <p:cNvSpPr>
+            <a:spLocks noGrp="1"/>
+          </p:cNvSpPr>
+          <p:nvPr>
+            <p:ph type="body" sz="half" idx="2"/>
+          </p:nvPr>
+        </p:nvSpPr>
+        <p:spPr>
+          <a:xfrm>
+            <a:off x="3521205" y="11556206"/>
+            <a:ext cx="16487748" cy="21409302"/>
           </a:xfrm>
         </p:spPr>
         <p:txBody>
@@ -2682,129 +2750,68 @@
           <a:lstStyle>
             <a:lvl1pPr marL="0" indent="0">
               <a:buNone/>
-              <a:defRPr sz="3200"/>
+              <a:defRPr sz="8945"/>
             </a:lvl1pPr>
-            <a:lvl2pPr marL="457200" indent="0">
-              <a:buNone/>
-              <a:defRPr sz="2800"/>
+            <a:lvl2pPr marL="2556022" indent="0">
+              <a:buNone/>
+              <a:defRPr sz="7827"/>
             </a:lvl2pPr>
-            <a:lvl3pPr marL="914400" indent="0">
-              <a:buNone/>
-              <a:defRPr sz="2400"/>
+            <a:lvl3pPr marL="5112045" indent="0">
+              <a:buNone/>
+              <a:defRPr sz="6709"/>
             </a:lvl3pPr>
-            <a:lvl4pPr marL="1371600" indent="0">
-              <a:buNone/>
-              <a:defRPr sz="2000"/>
+            <a:lvl4pPr marL="7668067" indent="0">
+              <a:buNone/>
+              <a:defRPr sz="5591"/>
             </a:lvl4pPr>
-            <a:lvl5pPr marL="1828800" indent="0">
-              <a:buNone/>
-              <a:defRPr sz="2000"/>
+            <a:lvl5pPr marL="10224089" indent="0">
+              <a:buNone/>
+              <a:defRPr sz="5591"/>
             </a:lvl5pPr>
-            <a:lvl6pPr marL="2286000" indent="0">
-              <a:buNone/>
-              <a:defRPr sz="2000"/>
+            <a:lvl6pPr marL="12780112" indent="0">
+              <a:buNone/>
+              <a:defRPr sz="5591"/>
             </a:lvl6pPr>
-            <a:lvl7pPr marL="2743200" indent="0">
-              <a:buNone/>
-              <a:defRPr sz="2000"/>
+            <a:lvl7pPr marL="15336134" indent="0">
+              <a:buNone/>
+              <a:defRPr sz="5591"/>
             </a:lvl7pPr>
-            <a:lvl8pPr marL="3200400" indent="0">
-              <a:buNone/>
-              <a:defRPr sz="2000"/>
+            <a:lvl8pPr marL="17892156" indent="0">
+              <a:buNone/>
+              <a:defRPr sz="5591"/>
             </a:lvl8pPr>
-            <a:lvl9pPr marL="3657600" indent="0">
-              <a:buNone/>
-              <a:defRPr sz="2000"/>
+            <a:lvl9pPr marL="20448179" indent="0">
+              <a:buNone/>
+              <a:defRPr sz="5591"/>
             </a:lvl9pPr>
           </a:lstStyle>
           <a:p>
-            <a:endParaRPr lang="en-US"/>
-          </a:p>
-        </p:txBody>
-      </p:sp>
-      <p:sp>
-        <p:nvSpPr>
-          <p:cNvPr id="4" name="Text Placeholder 3"/>
-          <p:cNvSpPr>
-            <a:spLocks noGrp="1"/>
-          </p:cNvSpPr>
-          <p:nvPr>
-            <p:ph type="body" sz="half" idx="2"/>
-          </p:nvPr>
-        </p:nvSpPr>
-        <p:spPr>
-          <a:xfrm>
-            <a:off x="839788" y="2057400"/>
-            <a:ext cx="3932237" cy="3811588"/>
-          </a:xfrm>
-        </p:spPr>
+            <a:pPr lvl="0"/>
+            <a:r>
+              <a:rPr lang="en-US" smtClean="0"/>
+              <a:t>Click to edit Master text styles</a:t>
+            </a:r>
+          </a:p>
+        </p:txBody>
+      </p:sp>
+      <p:sp>
+        <p:nvSpPr>
+          <p:cNvPr id="5" name="Date Placeholder 4"/>
+          <p:cNvSpPr>
+            <a:spLocks noGrp="1"/>
+          </p:cNvSpPr>
+          <p:nvPr>
+            <p:ph type="dt" sz="half" idx="10"/>
+          </p:nvPr>
+        </p:nvSpPr>
+        <p:spPr/>
         <p:txBody>
           <a:bodyPr/>
-          <a:lstStyle>
-            <a:lvl1pPr marL="0" indent="0">
-              <a:buNone/>
-              <a:defRPr sz="1600"/>
-            </a:lvl1pPr>
-            <a:lvl2pPr marL="457200" indent="0">
-              <a:buNone/>
-              <a:defRPr sz="1400"/>
-            </a:lvl2pPr>
-            <a:lvl3pPr marL="914400" indent="0">
-              <a:buNone/>
-              <a:defRPr sz="1200"/>
-            </a:lvl3pPr>
-            <a:lvl4pPr marL="1371600" indent="0">
-              <a:buNone/>
-              <a:defRPr sz="1000"/>
-            </a:lvl4pPr>
-            <a:lvl5pPr marL="1828800" indent="0">
-              <a:buNone/>
-              <a:defRPr sz="1000"/>
-            </a:lvl5pPr>
-            <a:lvl6pPr marL="2286000" indent="0">
-              <a:buNone/>
-              <a:defRPr sz="1000"/>
-            </a:lvl6pPr>
-            <a:lvl7pPr marL="2743200" indent="0">
-              <a:buNone/>
-              <a:defRPr sz="1000"/>
-            </a:lvl7pPr>
-            <a:lvl8pPr marL="3200400" indent="0">
-              <a:buNone/>
-              <a:defRPr sz="1000"/>
-            </a:lvl8pPr>
-            <a:lvl9pPr marL="3657600" indent="0">
-              <a:buNone/>
-              <a:defRPr sz="1000"/>
-            </a:lvl9pPr>
-          </a:lstStyle>
-          <a:p>
-            <a:pPr lvl="0"/>
-            <a:r>
-              <a:rPr lang="en-US" smtClean="0"/>
-              <a:t>Click to edit Master text styles</a:t>
-            </a:r>
-          </a:p>
-        </p:txBody>
-      </p:sp>
-      <p:sp>
-        <p:nvSpPr>
-          <p:cNvPr id="5" name="Date Placeholder 4"/>
-          <p:cNvSpPr>
-            <a:spLocks noGrp="1"/>
-          </p:cNvSpPr>
-          <p:nvPr>
-            <p:ph type="dt" sz="half" idx="10"/>
-          </p:nvPr>
-        </p:nvSpPr>
-        <p:spPr/>
-        <p:txBody>
-          <a:bodyPr/>
           <a:lstStyle/>
           <a:p>
             <a:fld id="{AEE6CD16-A7F0-7F48-B549-C1BC0367B119}" type="datetimeFigureOut">
               <a:rPr lang="en-US" smtClean="0"/>
-              <a:t>3/9/17</a:t>
+              <a:t>3/13/17</a:t>
             </a:fld>
             <a:endParaRPr lang="en-US"/>
           </a:p>
@@ -2855,7 +2862,7 @@
     </p:spTree>
     <p:extLst>
       <p:ext uri="{BB962C8B-B14F-4D97-AF65-F5344CB8AC3E}">
-        <p14:creationId xmlns:p14="http://schemas.microsoft.com/office/powerpoint/2010/main" val="5451747"/>
+        <p14:creationId xmlns:p14="http://schemas.microsoft.com/office/powerpoint/2010/main" val="1880174717"/>
       </p:ext>
     </p:extLst>
   </p:cSld>
@@ -2899,8 +2906,8 @@
         </p:nvSpPr>
         <p:spPr>
           <a:xfrm>
-            <a:off x="838200" y="365125"/>
-            <a:ext cx="10515600" cy="1325563"/>
+            <a:off x="3514547" y="2050879"/>
+            <a:ext cx="44091582" cy="7445552"/>
           </a:xfrm>
           <a:prstGeom prst="rect">
             <a:avLst/>
@@ -2916,7 +2923,7 @@
               <a:rPr lang="en-US" smtClean="0"/>
               <a:t>Click to edit Master title style</a:t>
             </a:r>
-            <a:endParaRPr lang="en-US"/>
+            <a:endParaRPr lang="en-US" dirty="0"/>
           </a:p>
         </p:txBody>
       </p:sp>
@@ -2932,8 +2939,8 @@
         </p:nvSpPr>
         <p:spPr>
           <a:xfrm>
-            <a:off x="838200" y="1825625"/>
-            <a:ext cx="10515600" cy="4351338"/>
+            <a:off x="3514547" y="10254350"/>
+            <a:ext cx="44091582" cy="24441023"/>
           </a:xfrm>
           <a:prstGeom prst="rect">
             <a:avLst/>
@@ -2978,7 +2985,7 @@
               <a:rPr lang="en-US" smtClean="0"/>
               <a:t>Fifth level</a:t>
             </a:r>
-            <a:endParaRPr lang="en-US"/>
+            <a:endParaRPr lang="en-US" dirty="0"/>
           </a:p>
         </p:txBody>
       </p:sp>
@@ -2994,8 +3001,8 @@
         </p:nvSpPr>
         <p:spPr>
           <a:xfrm>
-            <a:off x="838200" y="6356350"/>
-            <a:ext cx="2743200" cy="365125"/>
+            <a:off x="3514546" y="35702979"/>
+            <a:ext cx="11502152" cy="2050870"/>
           </a:xfrm>
           <a:prstGeom prst="rect">
             <a:avLst/>
@@ -3005,7 +3012,7 @@
           <a:bodyPr vert="horz" lIns="91440" tIns="45720" rIns="91440" bIns="45720" rtlCol="0" anchor="ctr"/>
           <a:lstStyle>
             <a:lvl1pPr algn="l">
-              <a:defRPr sz="1200">
+              <a:defRPr sz="6709">
                 <a:solidFill>
                   <a:schemeClr val="tx1">
                     <a:tint val="75000"/>
@@ -3017,7 +3024,7 @@
           <a:p>
             <a:fld id="{AEE6CD16-A7F0-7F48-B549-C1BC0367B119}" type="datetimeFigureOut">
               <a:rPr lang="en-US" smtClean="0"/>
-              <a:t>3/9/17</a:t>
+              <a:t>3/13/17</a:t>
             </a:fld>
             <a:endParaRPr lang="en-US"/>
           </a:p>
@@ -3035,8 +3042,8 @@
         </p:nvSpPr>
         <p:spPr>
           <a:xfrm>
-            <a:off x="4038600" y="6356350"/>
-            <a:ext cx="4114800" cy="365125"/>
+            <a:off x="16933724" y="35702979"/>
+            <a:ext cx="17253228" cy="2050870"/>
           </a:xfrm>
           <a:prstGeom prst="rect">
             <a:avLst/>
@@ -3046,7 +3053,7 @@
           <a:bodyPr vert="horz" lIns="91440" tIns="45720" rIns="91440" bIns="45720" rtlCol="0" anchor="ctr"/>
           <a:lstStyle>
             <a:lvl1pPr algn="ctr">
-              <a:defRPr sz="1200">
+              <a:defRPr sz="6709">
                 <a:solidFill>
                   <a:schemeClr val="tx1">
                     <a:tint val="75000"/>
@@ -3072,8 +3079,8 @@
         </p:nvSpPr>
         <p:spPr>
           <a:xfrm>
-            <a:off x="8610600" y="6356350"/>
-            <a:ext cx="2743200" cy="365125"/>
+            <a:off x="36103977" y="35702979"/>
+            <a:ext cx="11502152" cy="2050870"/>
           </a:xfrm>
           <a:prstGeom prst="rect">
             <a:avLst/>
@@ -3083,7 +3090,7 @@
           <a:bodyPr vert="horz" lIns="91440" tIns="45720" rIns="91440" bIns="45720" rtlCol="0" anchor="ctr"/>
           <a:lstStyle>
             <a:lvl1pPr algn="r">
-              <a:defRPr sz="1200">
+              <a:defRPr sz="6709">
                 <a:solidFill>
                   <a:schemeClr val="tx1">
                     <a:tint val="75000"/>
@@ -3104,27 +3111,27 @@
     </p:spTree>
     <p:extLst>
       <p:ext uri="{BB962C8B-B14F-4D97-AF65-F5344CB8AC3E}">
-        <p14:creationId xmlns:p14="http://schemas.microsoft.com/office/powerpoint/2010/main" val="829710579"/>
+        <p14:creationId xmlns:p14="http://schemas.microsoft.com/office/powerpoint/2010/main" val="508320596"/>
       </p:ext>
     </p:extLst>
   </p:cSld>
   <p:clrMap bg1="lt1" tx1="dk1" bg2="lt2" tx2="dk2" accent1="accent1" accent2="accent2" accent3="accent3" accent4="accent4" accent5="accent5" accent6="accent6" hlink="hlink" folHlink="folHlink"/>
   <p:sldLayoutIdLst>
-    <p:sldLayoutId id="2147483649" r:id="rId1"/>
-    <p:sldLayoutId id="2147483650" r:id="rId2"/>
-    <p:sldLayoutId id="2147483651" r:id="rId3"/>
-    <p:sldLayoutId id="2147483652" r:id="rId4"/>
-    <p:sldLayoutId id="2147483653" r:id="rId5"/>
-    <p:sldLayoutId id="2147483654" r:id="rId6"/>
-    <p:sldLayoutId id="2147483655" r:id="rId7"/>
-    <p:sldLayoutId id="2147483656" r:id="rId8"/>
-    <p:sldLayoutId id="2147483657" r:id="rId9"/>
-    <p:sldLayoutId id="2147483658" r:id="rId10"/>
-    <p:sldLayoutId id="2147483659" r:id="rId11"/>
+    <p:sldLayoutId id="2147483661" r:id="rId1"/>
+    <p:sldLayoutId id="2147483662" r:id="rId2"/>
+    <p:sldLayoutId id="2147483663" r:id="rId3"/>
+    <p:sldLayoutId id="2147483664" r:id="rId4"/>
+    <p:sldLayoutId id="2147483665" r:id="rId5"/>
+    <p:sldLayoutId id="2147483666" r:id="rId6"/>
+    <p:sldLayoutId id="2147483667" r:id="rId7"/>
+    <p:sldLayoutId id="2147483668" r:id="rId8"/>
+    <p:sldLayoutId id="2147483669" r:id="rId9"/>
+    <p:sldLayoutId id="2147483670" r:id="rId10"/>
+    <p:sldLayoutId id="2147483671" r:id="rId11"/>
   </p:sldLayoutIdLst>
   <p:txStyles>
     <p:titleStyle>
-      <a:lvl1pPr algn="l" defTabSz="914400" rtl="0" eaLnBrk="1" latinLnBrk="0" hangingPunct="1">
+      <a:lvl1pPr algn="l" defTabSz="5112045" rtl="0" eaLnBrk="1" latinLnBrk="0" hangingPunct="1">
         <a:lnSpc>
           <a:spcPct val="90000"/>
         </a:lnSpc>
@@ -3132,7 +3139,7 @@
           <a:spcPct val="0"/>
         </a:spcBef>
         <a:buNone/>
-        <a:defRPr sz="4400" kern="1200">
+        <a:defRPr sz="24599" kern="1200">
           <a:solidFill>
             <a:schemeClr val="tx1"/>
           </a:solidFill>
@@ -3143,16 +3150,16 @@
       </a:lvl1pPr>
     </p:titleStyle>
     <p:bodyStyle>
-      <a:lvl1pPr marL="228600" indent="-228600" algn="l" defTabSz="914400" rtl="0" eaLnBrk="1" latinLnBrk="0" hangingPunct="1">
+      <a:lvl1pPr marL="1278011" indent="-1278011" algn="l" defTabSz="5112045" rtl="0" eaLnBrk="1" latinLnBrk="0" hangingPunct="1">
         <a:lnSpc>
           <a:spcPct val="90000"/>
         </a:lnSpc>
         <a:spcBef>
-          <a:spcPts val="1000"/>
+          <a:spcPts val="5591"/>
         </a:spcBef>
-        <a:buFont typeface="Arial"/>
+        <a:buFont typeface="Arial" panose="020B0604020202020204" pitchFamily="34" charset="0"/>
         <a:buChar char="•"/>
-        <a:defRPr sz="2800" kern="1200">
+        <a:defRPr sz="15654" kern="1200">
           <a:solidFill>
             <a:schemeClr val="tx1"/>
           </a:solidFill>
@@ -3161,16 +3168,16 @@
           <a:cs typeface="+mn-cs"/>
         </a:defRPr>
       </a:lvl1pPr>
-      <a:lvl2pPr marL="685800" indent="-228600" algn="l" defTabSz="914400" rtl="0" eaLnBrk="1" latinLnBrk="0" hangingPunct="1">
+      <a:lvl2pPr marL="3834033" indent="-1278011" algn="l" defTabSz="5112045" rtl="0" eaLnBrk="1" latinLnBrk="0" hangingPunct="1">
         <a:lnSpc>
           <a:spcPct val="90000"/>
         </a:lnSpc>
         <a:spcBef>
-          <a:spcPts val="500"/>
+          <a:spcPts val="2795"/>
         </a:spcBef>
-        <a:buFont typeface="Arial"/>
+        <a:buFont typeface="Arial" panose="020B0604020202020204" pitchFamily="34" charset="0"/>
         <a:buChar char="•"/>
-        <a:defRPr sz="2400" kern="1200">
+        <a:defRPr sz="13417" kern="1200">
           <a:solidFill>
             <a:schemeClr val="tx1"/>
           </a:solidFill>
@@ -3179,16 +3186,16 @@
           <a:cs typeface="+mn-cs"/>
         </a:defRPr>
       </a:lvl2pPr>
-      <a:lvl3pPr marL="1143000" indent="-228600" algn="l" defTabSz="914400" rtl="0" eaLnBrk="1" latinLnBrk="0" hangingPunct="1">
+      <a:lvl3pPr marL="6390056" indent="-1278011" algn="l" defTabSz="5112045" rtl="0" eaLnBrk="1" latinLnBrk="0" hangingPunct="1">
         <a:lnSpc>
           <a:spcPct val="90000"/>
         </a:lnSpc>
         <a:spcBef>
-          <a:spcPts val="500"/>
+          <a:spcPts val="2795"/>
         </a:spcBef>
-        <a:buFont typeface="Arial"/>
+        <a:buFont typeface="Arial" panose="020B0604020202020204" pitchFamily="34" charset="0"/>
         <a:buChar char="•"/>
-        <a:defRPr sz="2000" kern="1200">
+        <a:defRPr sz="11181" kern="1200">
           <a:solidFill>
             <a:schemeClr val="tx1"/>
           </a:solidFill>
@@ -3197,16 +3204,16 @@
           <a:cs typeface="+mn-cs"/>
         </a:defRPr>
       </a:lvl3pPr>
-      <a:lvl4pPr marL="1600200" indent="-228600" algn="l" defTabSz="914400" rtl="0" eaLnBrk="1" latinLnBrk="0" hangingPunct="1">
+      <a:lvl4pPr marL="8946078" indent="-1278011" algn="l" defTabSz="5112045" rtl="0" eaLnBrk="1" latinLnBrk="0" hangingPunct="1">
         <a:lnSpc>
           <a:spcPct val="90000"/>
         </a:lnSpc>
         <a:spcBef>
-          <a:spcPts val="500"/>
+          <a:spcPts val="2795"/>
         </a:spcBef>
-        <a:buFont typeface="Arial"/>
+        <a:buFont typeface="Arial" panose="020B0604020202020204" pitchFamily="34" charset="0"/>
         <a:buChar char="•"/>
-        <a:defRPr sz="1800" kern="1200">
+        <a:defRPr sz="10063" kern="1200">
           <a:solidFill>
             <a:schemeClr val="tx1"/>
           </a:solidFill>
@@ -3215,16 +3222,16 @@
           <a:cs typeface="+mn-cs"/>
         </a:defRPr>
       </a:lvl4pPr>
-      <a:lvl5pPr marL="2057400" indent="-228600" algn="l" defTabSz="914400" rtl="0" eaLnBrk="1" latinLnBrk="0" hangingPunct="1">
+      <a:lvl5pPr marL="11502100" indent="-1278011" algn="l" defTabSz="5112045" rtl="0" eaLnBrk="1" latinLnBrk="0" hangingPunct="1">
         <a:lnSpc>
           <a:spcPct val="90000"/>
         </a:lnSpc>
         <a:spcBef>
-          <a:spcPts val="500"/>
+          <a:spcPts val="2795"/>
         </a:spcBef>
-        <a:buFont typeface="Arial"/>
+        <a:buFont typeface="Arial" panose="020B0604020202020204" pitchFamily="34" charset="0"/>
         <a:buChar char="•"/>
-        <a:defRPr sz="1800" kern="1200">
+        <a:defRPr sz="10063" kern="1200">
           <a:solidFill>
             <a:schemeClr val="tx1"/>
           </a:solidFill>
@@ -3233,16 +3240,16 @@
           <a:cs typeface="+mn-cs"/>
         </a:defRPr>
       </a:lvl5pPr>
-      <a:lvl6pPr marL="2514600" indent="-228600" algn="l" defTabSz="914400" rtl="0" eaLnBrk="1" latinLnBrk="0" hangingPunct="1">
+      <a:lvl6pPr marL="14058123" indent="-1278011" algn="l" defTabSz="5112045" rtl="0" eaLnBrk="1" latinLnBrk="0" hangingPunct="1">
         <a:lnSpc>
           <a:spcPct val="90000"/>
         </a:lnSpc>
         <a:spcBef>
-          <a:spcPts val="500"/>
+          <a:spcPts val="2795"/>
         </a:spcBef>
-        <a:buFont typeface="Arial"/>
+        <a:buFont typeface="Arial" panose="020B0604020202020204" pitchFamily="34" charset="0"/>
         <a:buChar char="•"/>
-        <a:defRPr sz="1800" kern="1200">
+        <a:defRPr sz="10063" kern="1200">
           <a:solidFill>
             <a:schemeClr val="tx1"/>
           </a:solidFill>
@@ -3251,16 +3258,16 @@
           <a:cs typeface="+mn-cs"/>
         </a:defRPr>
       </a:lvl6pPr>
-      <a:lvl7pPr marL="2971800" indent="-228600" algn="l" defTabSz="914400" rtl="0" eaLnBrk="1" latinLnBrk="0" hangingPunct="1">
+      <a:lvl7pPr marL="16614145" indent="-1278011" algn="l" defTabSz="5112045" rtl="0" eaLnBrk="1" latinLnBrk="0" hangingPunct="1">
         <a:lnSpc>
           <a:spcPct val="90000"/>
         </a:lnSpc>
         <a:spcBef>
-          <a:spcPts val="500"/>
+          <a:spcPts val="2795"/>
         </a:spcBef>
-        <a:buFont typeface="Arial"/>
+        <a:buFont typeface="Arial" panose="020B0604020202020204" pitchFamily="34" charset="0"/>
         <a:buChar char="•"/>
-        <a:defRPr sz="1800" kern="1200">
+        <a:defRPr sz="10063" kern="1200">
           <a:solidFill>
             <a:schemeClr val="tx1"/>
           </a:solidFill>
@@ -3269,16 +3276,16 @@
           <a:cs typeface="+mn-cs"/>
         </a:defRPr>
       </a:lvl7pPr>
-      <a:lvl8pPr marL="3429000" indent="-228600" algn="l" defTabSz="914400" rtl="0" eaLnBrk="1" latinLnBrk="0" hangingPunct="1">
+      <a:lvl8pPr marL="19170167" indent="-1278011" algn="l" defTabSz="5112045" rtl="0" eaLnBrk="1" latinLnBrk="0" hangingPunct="1">
         <a:lnSpc>
           <a:spcPct val="90000"/>
         </a:lnSpc>
         <a:spcBef>
-          <a:spcPts val="500"/>
+          <a:spcPts val="2795"/>
         </a:spcBef>
-        <a:buFont typeface="Arial"/>
+        <a:buFont typeface="Arial" panose="020B0604020202020204" pitchFamily="34" charset="0"/>
         <a:buChar char="•"/>
-        <a:defRPr sz="1800" kern="1200">
+        <a:defRPr sz="10063" kern="1200">
           <a:solidFill>
             <a:schemeClr val="tx1"/>
           </a:solidFill>
@@ -3287,16 +3294,16 @@
           <a:cs typeface="+mn-cs"/>
         </a:defRPr>
       </a:lvl8pPr>
-      <a:lvl9pPr marL="3886200" indent="-228600" algn="l" defTabSz="914400" rtl="0" eaLnBrk="1" latinLnBrk="0" hangingPunct="1">
+      <a:lvl9pPr marL="21726190" indent="-1278011" algn="l" defTabSz="5112045" rtl="0" eaLnBrk="1" latinLnBrk="0" hangingPunct="1">
         <a:lnSpc>
           <a:spcPct val="90000"/>
         </a:lnSpc>
         <a:spcBef>
-          <a:spcPts val="500"/>
+          <a:spcPts val="2795"/>
         </a:spcBef>
-        <a:buFont typeface="Arial"/>
+        <a:buFont typeface="Arial" panose="020B0604020202020204" pitchFamily="34" charset="0"/>
         <a:buChar char="•"/>
-        <a:defRPr sz="1800" kern="1200">
+        <a:defRPr sz="10063" kern="1200">
           <a:solidFill>
             <a:schemeClr val="tx1"/>
           </a:solidFill>
@@ -3310,8 +3317,8 @@
       <a:defPPr>
         <a:defRPr lang="en-US"/>
       </a:defPPr>
-      <a:lvl1pPr marL="0" algn="l" defTabSz="914400" rtl="0" eaLnBrk="1" latinLnBrk="0" hangingPunct="1">
-        <a:defRPr sz="1800" kern="1200">
+      <a:lvl1pPr marL="0" algn="l" defTabSz="5112045" rtl="0" eaLnBrk="1" latinLnBrk="0" hangingPunct="1">
+        <a:defRPr sz="10063" kern="1200">
           <a:solidFill>
             <a:schemeClr val="tx1"/>
           </a:solidFill>
@@ -3320,8 +3327,8 @@
           <a:cs typeface="+mn-cs"/>
         </a:defRPr>
       </a:lvl1pPr>
-      <a:lvl2pPr marL="457200" algn="l" defTabSz="914400" rtl="0" eaLnBrk="1" latinLnBrk="0" hangingPunct="1">
-        <a:defRPr sz="1800" kern="1200">
+      <a:lvl2pPr marL="2556022" algn="l" defTabSz="5112045" rtl="0" eaLnBrk="1" latinLnBrk="0" hangingPunct="1">
+        <a:defRPr sz="10063" kern="1200">
           <a:solidFill>
             <a:schemeClr val="tx1"/>
           </a:solidFill>
@@ -3330,8 +3337,8 @@
           <a:cs typeface="+mn-cs"/>
         </a:defRPr>
       </a:lvl2pPr>
-      <a:lvl3pPr marL="914400" algn="l" defTabSz="914400" rtl="0" eaLnBrk="1" latinLnBrk="0" hangingPunct="1">
-        <a:defRPr sz="1800" kern="1200">
+      <a:lvl3pPr marL="5112045" algn="l" defTabSz="5112045" rtl="0" eaLnBrk="1" latinLnBrk="0" hangingPunct="1">
+        <a:defRPr sz="10063" kern="1200">
           <a:solidFill>
             <a:schemeClr val="tx1"/>
           </a:solidFill>
@@ -3340,8 +3347,8 @@
           <a:cs typeface="+mn-cs"/>
         </a:defRPr>
       </a:lvl3pPr>
-      <a:lvl4pPr marL="1371600" algn="l" defTabSz="914400" rtl="0" eaLnBrk="1" latinLnBrk="0" hangingPunct="1">
-        <a:defRPr sz="1800" kern="1200">
+      <a:lvl4pPr marL="7668067" algn="l" defTabSz="5112045" rtl="0" eaLnBrk="1" latinLnBrk="0" hangingPunct="1">
+        <a:defRPr sz="10063" kern="1200">
           <a:solidFill>
             <a:schemeClr val="tx1"/>
           </a:solidFill>
@@ -3350,8 +3357,8 @@
           <a:cs typeface="+mn-cs"/>
         </a:defRPr>
       </a:lvl4pPr>
-      <a:lvl5pPr marL="1828800" algn="l" defTabSz="914400" rtl="0" eaLnBrk="1" latinLnBrk="0" hangingPunct="1">
-        <a:defRPr sz="1800" kern="1200">
+      <a:lvl5pPr marL="10224089" algn="l" defTabSz="5112045" rtl="0" eaLnBrk="1" latinLnBrk="0" hangingPunct="1">
+        <a:defRPr sz="10063" kern="1200">
           <a:solidFill>
             <a:schemeClr val="tx1"/>
           </a:solidFill>
@@ -3360,8 +3367,8 @@
           <a:cs typeface="+mn-cs"/>
         </a:defRPr>
       </a:lvl5pPr>
-      <a:lvl6pPr marL="2286000" algn="l" defTabSz="914400" rtl="0" eaLnBrk="1" latinLnBrk="0" hangingPunct="1">
-        <a:defRPr sz="1800" kern="1200">
+      <a:lvl6pPr marL="12780112" algn="l" defTabSz="5112045" rtl="0" eaLnBrk="1" latinLnBrk="0" hangingPunct="1">
+        <a:defRPr sz="10063" kern="1200">
           <a:solidFill>
             <a:schemeClr val="tx1"/>
           </a:solidFill>
@@ -3370,8 +3377,8 @@
           <a:cs typeface="+mn-cs"/>
         </a:defRPr>
       </a:lvl6pPr>
-      <a:lvl7pPr marL="2743200" algn="l" defTabSz="914400" rtl="0" eaLnBrk="1" latinLnBrk="0" hangingPunct="1">
-        <a:defRPr sz="1800" kern="1200">
+      <a:lvl7pPr marL="15336134" algn="l" defTabSz="5112045" rtl="0" eaLnBrk="1" latinLnBrk="0" hangingPunct="1">
+        <a:defRPr sz="10063" kern="1200">
           <a:solidFill>
             <a:schemeClr val="tx1"/>
           </a:solidFill>
@@ -3380,8 +3387,8 @@
           <a:cs typeface="+mn-cs"/>
         </a:defRPr>
       </a:lvl7pPr>
-      <a:lvl8pPr marL="3200400" algn="l" defTabSz="914400" rtl="0" eaLnBrk="1" latinLnBrk="0" hangingPunct="1">
-        <a:defRPr sz="1800" kern="1200">
+      <a:lvl8pPr marL="17892156" algn="l" defTabSz="5112045" rtl="0" eaLnBrk="1" latinLnBrk="0" hangingPunct="1">
+        <a:defRPr sz="10063" kern="1200">
           <a:solidFill>
             <a:schemeClr val="tx1"/>
           </a:solidFill>
@@ -3390,8 +3397,8 @@
           <a:cs typeface="+mn-cs"/>
         </a:defRPr>
       </a:lvl8pPr>
-      <a:lvl9pPr marL="3657600" algn="l" defTabSz="914400" rtl="0" eaLnBrk="1" latinLnBrk="0" hangingPunct="1">
-        <a:defRPr sz="1800" kern="1200">
+      <a:lvl9pPr marL="20448179" algn="l" defTabSz="5112045" rtl="0" eaLnBrk="1" latinLnBrk="0" hangingPunct="1">
+        <a:defRPr sz="10063" kern="1200">
           <a:solidFill>
             <a:schemeClr val="tx1"/>
           </a:solidFill>
@@ -3438,8 +3445,8 @@
         </p:nvSpPr>
         <p:spPr>
           <a:xfrm>
-            <a:off x="8568267" y="1451329"/>
-            <a:ext cx="3048000" cy="1170517"/>
+            <a:off x="35926474" y="7767644"/>
+            <a:ext cx="12780169" cy="4907941"/>
           </a:xfrm>
           <a:prstGeom prst="rect">
             <a:avLst/>
@@ -3468,19 +3475,19 @@
           </a:fontRef>
         </p:style>
         <p:txBody>
-          <a:bodyPr rtlCol="0" anchor="t" anchorCtr="0"/>
+          <a:bodyPr tIns="46800" rtlCol="0" anchor="t" anchorCtr="0"/>
           <a:lstStyle/>
           <a:p>
             <a:pPr algn="ctr"/>
             <a:r>
-              <a:rPr lang="en-US" sz="1500" dirty="0" smtClean="0">
+              <a:rPr lang="en-US" sz="7500" dirty="0">
                 <a:latin typeface="Helvetica" charset="0"/>
                 <a:ea typeface="Helvetica" charset="0"/>
                 <a:cs typeface="Helvetica" charset="0"/>
               </a:rPr>
               <a:t>Motivation</a:t>
             </a:r>
-            <a:endParaRPr lang="en-US" sz="1500" dirty="0">
+            <a:endParaRPr lang="en-US" sz="7500" dirty="0">
               <a:latin typeface="Helvetica" charset="0"/>
               <a:ea typeface="Helvetica" charset="0"/>
               <a:cs typeface="Helvetica" charset="0"/>
@@ -3496,8 +3503,8 @@
         </p:nvSpPr>
         <p:spPr>
           <a:xfrm>
-            <a:off x="8568267" y="1778000"/>
-            <a:ext cx="3048000" cy="1022048"/>
+            <a:off x="35926473" y="9592869"/>
+            <a:ext cx="12780169" cy="4674231"/>
           </a:xfrm>
           <a:prstGeom prst="rect">
             <a:avLst/>
@@ -3529,12 +3536,12 @@
           <a:bodyPr rtlCol="0" anchor="t" anchorCtr="0"/>
           <a:lstStyle/>
           <a:p>
-            <a:pPr marL="171450" indent="-171450">
+            <a:pPr marL="718911" indent="-718911">
               <a:buFont typeface="Arial" charset="0"/>
               <a:buChar char="•"/>
             </a:pPr>
             <a:r>
-              <a:rPr lang="en-US" sz="1000" dirty="0" smtClean="0">
+              <a:rPr lang="en-US" sz="3500" dirty="0">
                 <a:solidFill>
                   <a:srgbClr val="335C81"/>
                 </a:solidFill>
@@ -3546,12 +3553,12 @@
             </a:r>
           </a:p>
           <a:p>
-            <a:pPr marL="171450" indent="-171450">
+            <a:pPr marL="718911" indent="-718911">
               <a:buFont typeface="Arial" charset="0"/>
               <a:buChar char="•"/>
             </a:pPr>
             <a:r>
-              <a:rPr lang="en-US" sz="1000" dirty="0" smtClean="0">
+              <a:rPr lang="en-US" sz="3500" dirty="0">
                 <a:solidFill>
                   <a:srgbClr val="335C81"/>
                 </a:solidFill>
@@ -3572,8 +3579,8 @@
         </p:nvSpPr>
         <p:spPr>
           <a:xfrm>
-            <a:off x="592667" y="1451329"/>
-            <a:ext cx="3048000" cy="1490133"/>
+            <a:off x="2302154" y="7767643"/>
+            <a:ext cx="12780169" cy="6248081"/>
           </a:xfrm>
           <a:prstGeom prst="rect">
             <a:avLst/>
@@ -3602,19 +3609,19 @@
           </a:fontRef>
         </p:style>
         <p:txBody>
-          <a:bodyPr rtlCol="0" anchor="t" anchorCtr="0"/>
+          <a:bodyPr tIns="46800" rtlCol="0" anchor="t" anchorCtr="0"/>
           <a:lstStyle/>
           <a:p>
             <a:pPr algn="ctr"/>
             <a:r>
-              <a:rPr lang="en-US" sz="1500" dirty="0" smtClean="0">
+              <a:rPr lang="en-US" sz="7500" dirty="0">
                 <a:latin typeface="Helvetica" charset="0"/>
                 <a:ea typeface="Helvetica" charset="0"/>
                 <a:cs typeface="Helvetica" charset="0"/>
               </a:rPr>
               <a:t>Theory</a:t>
             </a:r>
-            <a:endParaRPr lang="en-US" sz="1500" dirty="0">
+            <a:endParaRPr lang="en-US" sz="7500" dirty="0">
               <a:latin typeface="Helvetica" charset="0"/>
               <a:ea typeface="Helvetica" charset="0"/>
               <a:cs typeface="Helvetica" charset="0"/>
@@ -3630,8 +3637,8 @@
         </p:nvSpPr>
         <p:spPr>
           <a:xfrm>
-            <a:off x="592667" y="1778000"/>
-            <a:ext cx="3048000" cy="1250124"/>
+            <a:off x="2294982" y="9592869"/>
+            <a:ext cx="12780169" cy="12681749"/>
           </a:xfrm>
           <a:prstGeom prst="rect">
             <a:avLst/>
@@ -3660,11 +3667,11 @@
           </a:fontRef>
         </p:style>
         <p:txBody>
-          <a:bodyPr rtlCol="0" anchor="ctr"/>
+          <a:bodyPr rtlCol="0" anchor="t" anchorCtr="0"/>
           <a:lstStyle/>
           <a:p>
             <a:pPr algn="ctr"/>
-            <a:endParaRPr lang="en-US"/>
+            <a:endParaRPr lang="en-US" sz="3500"/>
           </a:p>
         </p:txBody>
       </p:sp>
@@ -3676,8 +3683,8 @@
         </p:nvSpPr>
         <p:spPr>
           <a:xfrm>
-            <a:off x="7467601" y="42021"/>
-            <a:ext cx="4148666" cy="1231106"/>
+            <a:off x="31311425" y="824821"/>
+            <a:ext cx="17395227" cy="5999463"/>
           </a:xfrm>
           <a:prstGeom prst="rect">
             <a:avLst/>
@@ -3692,7 +3699,7 @@
           <a:p>
             <a:pPr algn="r"/>
             <a:r>
-              <a:rPr lang="en-US" sz="5400" b="1" dirty="0" smtClean="0">
+              <a:rPr lang="en-US" sz="30000" b="1" dirty="0">
                 <a:solidFill>
                   <a:srgbClr val="DCFFFD"/>
                 </a:solidFill>
@@ -3702,8 +3709,19 @@
               </a:rPr>
               <a:t>Voice</a:t>
             </a:r>
+            <a:r>
+              <a:rPr lang="en-US" sz="22642" b="1" dirty="0">
+                <a:solidFill>
+                  <a:srgbClr val="DCFFFD"/>
+                </a:solidFill>
+                <a:latin typeface="Garamond" charset="0"/>
+                <a:ea typeface="Garamond" charset="0"/>
+                <a:cs typeface="Garamond" charset="0"/>
+              </a:rPr>
+              <a:t/>
+            </a:r>
             <a:br>
-              <a:rPr lang="en-US" sz="5400" b="1" dirty="0" smtClean="0">
+              <a:rPr lang="en-US" sz="22642" b="1" dirty="0">
                 <a:solidFill>
                   <a:srgbClr val="DCFFFD"/>
                 </a:solidFill>
@@ -3713,7 +3731,7 @@
               </a:rPr>
             </a:br>
             <a:r>
-              <a:rPr lang="en-US" sz="2000" b="1" dirty="0" smtClean="0">
+              <a:rPr lang="en-US" sz="8386" b="1" dirty="0">
                 <a:solidFill>
                   <a:srgbClr val="DCFFFD"/>
                 </a:solidFill>
@@ -3723,7 +3741,7 @@
               </a:rPr>
               <a:t>Sign Language Translation System</a:t>
             </a:r>
-            <a:endParaRPr lang="en-US" sz="2000" b="1" dirty="0">
+            <a:endParaRPr lang="en-US" sz="8386" b="1" dirty="0">
               <a:solidFill>
                 <a:srgbClr val="DCFFFD"/>
               </a:solidFill>
@@ -3742,8 +3760,8 @@
         </p:nvSpPr>
         <p:spPr>
           <a:xfrm>
-            <a:off x="3962401" y="1451329"/>
-            <a:ext cx="4199466" cy="1490133"/>
+            <a:off x="16614227" y="7767644"/>
+            <a:ext cx="17608230" cy="6248081"/>
           </a:xfrm>
           <a:prstGeom prst="rect">
             <a:avLst/>
@@ -3772,19 +3790,19 @@
           </a:fontRef>
         </p:style>
         <p:txBody>
-          <a:bodyPr tIns="108000" rtlCol="0" anchor="t" anchorCtr="0"/>
+          <a:bodyPr tIns="46800" rtlCol="0" anchor="t" anchorCtr="0"/>
           <a:lstStyle/>
           <a:p>
             <a:pPr algn="ctr"/>
             <a:r>
-              <a:rPr lang="en-US" sz="1600" dirty="0" smtClean="0">
+              <a:rPr lang="en-US" sz="7500" dirty="0">
                 <a:latin typeface="Helvetica" charset="0"/>
                 <a:ea typeface="Helvetica" charset="0"/>
                 <a:cs typeface="Helvetica" charset="0"/>
               </a:rPr>
               <a:t>Principle of Operation</a:t>
             </a:r>
-            <a:endParaRPr lang="en-US" sz="1600" dirty="0">
+            <a:endParaRPr lang="en-US" sz="7500" dirty="0">
               <a:latin typeface="Helvetica" charset="0"/>
               <a:ea typeface="Helvetica" charset="0"/>
               <a:cs typeface="Helvetica" charset="0"/>
@@ -3800,8 +3818,8 @@
         </p:nvSpPr>
         <p:spPr>
           <a:xfrm>
-            <a:off x="3962401" y="1959329"/>
-            <a:ext cx="4199466" cy="1775772"/>
+            <a:off x="16614227" y="9592869"/>
+            <a:ext cx="17608230" cy="12681749"/>
           </a:xfrm>
           <a:prstGeom prst="rect">
             <a:avLst/>
@@ -3830,11 +3848,11 @@
           </a:fontRef>
         </p:style>
         <p:txBody>
-          <a:bodyPr rtlCol="0" anchor="ctr"/>
+          <a:bodyPr rtlCol="0" anchor="t" anchorCtr="0"/>
           <a:lstStyle/>
           <a:p>
             <a:pPr algn="ctr"/>
-            <a:endParaRPr lang="en-US"/>
+            <a:endParaRPr lang="en-US" sz="3500"/>
           </a:p>
         </p:txBody>
       </p:sp>
@@ -3846,8 +3864,8 @@
         </p:nvSpPr>
         <p:spPr>
           <a:xfrm>
-            <a:off x="8568267" y="3549188"/>
-            <a:ext cx="3048000" cy="877523"/>
+            <a:off x="35920288" y="29321864"/>
+            <a:ext cx="12780169" cy="3679427"/>
           </a:xfrm>
           <a:prstGeom prst="rect">
             <a:avLst/>
@@ -3876,19 +3894,19 @@
           </a:fontRef>
         </p:style>
         <p:txBody>
-          <a:bodyPr rtlCol="0" anchor="t" anchorCtr="0"/>
+          <a:bodyPr tIns="453600" rtlCol="0" anchor="t" anchorCtr="0"/>
           <a:lstStyle/>
           <a:p>
             <a:pPr algn="ctr"/>
             <a:r>
-              <a:rPr lang="en-US" sz="1500" dirty="0" smtClean="0">
+              <a:rPr lang="en-US" sz="7500" dirty="0" smtClean="0">
                 <a:latin typeface="Helvetica" charset="0"/>
                 <a:ea typeface="Helvetica" charset="0"/>
                 <a:cs typeface="Helvetica" charset="0"/>
               </a:rPr>
-              <a:t>Objective</a:t>
-            </a:r>
-            <a:endParaRPr lang="en-US" sz="1500" dirty="0">
+              <a:t>Features</a:t>
+            </a:r>
+            <a:endParaRPr lang="en-US" sz="7500" dirty="0">
               <a:latin typeface="Helvetica" charset="0"/>
               <a:ea typeface="Helvetica" charset="0"/>
               <a:cs typeface="Helvetica" charset="0"/>
@@ -3904,8 +3922,8 @@
         </p:nvSpPr>
         <p:spPr>
           <a:xfrm>
-            <a:off x="8568267" y="3844913"/>
-            <a:ext cx="3048000" cy="783605"/>
+            <a:off x="35917455" y="31046798"/>
+            <a:ext cx="12780169" cy="6006360"/>
           </a:xfrm>
           <a:prstGeom prst="rect">
             <a:avLst/>
@@ -3934,15 +3952,15 @@
           </a:fontRef>
         </p:style>
         <p:txBody>
-          <a:bodyPr rtlCol="0" anchor="ctr"/>
-          <a:lstStyle/>
-          <a:p>
-            <a:pPr marL="171450" lvl="0" indent="-171450">
+          <a:bodyPr rtlCol="0" anchor="t" anchorCtr="0"/>
+          <a:lstStyle/>
+          <a:p>
+            <a:pPr marL="718911" indent="-718911">
               <a:buFont typeface="Arial" charset="0"/>
               <a:buChar char="•"/>
             </a:pPr>
             <a:r>
-              <a:rPr lang="en-US" sz="1000" dirty="0" smtClean="0">
+              <a:rPr lang="en-US" sz="3500" dirty="0">
                 <a:solidFill>
                   <a:srgbClr val="335C81"/>
                 </a:solidFill>
@@ -3963,8 +3981,8 @@
         </p:nvSpPr>
         <p:spPr>
           <a:xfrm>
-            <a:off x="8568267" y="5371834"/>
-            <a:ext cx="3048000" cy="1170517"/>
+            <a:off x="35926473" y="15690081"/>
+            <a:ext cx="12780169" cy="4907941"/>
           </a:xfrm>
           <a:prstGeom prst="rect">
             <a:avLst/>
@@ -3993,19 +4011,19 @@
           </a:fontRef>
         </p:style>
         <p:txBody>
-          <a:bodyPr rtlCol="0" anchor="t" anchorCtr="0"/>
+          <a:bodyPr tIns="46800" rtlCol="0" anchor="t" anchorCtr="0"/>
           <a:lstStyle/>
           <a:p>
             <a:pPr algn="ctr"/>
             <a:r>
-              <a:rPr lang="en-US" sz="1500" dirty="0" smtClean="0">
+              <a:rPr lang="en-US" sz="7500" dirty="0">
                 <a:latin typeface="Helvetica" charset="0"/>
                 <a:ea typeface="Helvetica" charset="0"/>
                 <a:cs typeface="Helvetica" charset="0"/>
               </a:rPr>
-              <a:t>Advantages</a:t>
-            </a:r>
-            <a:endParaRPr lang="en-US" sz="1500" dirty="0">
+              <a:t>Objective</a:t>
+            </a:r>
+            <a:endParaRPr lang="en-US" sz="7500" dirty="0">
               <a:latin typeface="Helvetica" charset="0"/>
               <a:ea typeface="Helvetica" charset="0"/>
               <a:cs typeface="Helvetica" charset="0"/>
@@ -4021,8 +4039,8 @@
         </p:nvSpPr>
         <p:spPr>
           <a:xfrm>
-            <a:off x="8568267" y="5665654"/>
-            <a:ext cx="3048000" cy="876697"/>
+            <a:off x="35920288" y="17438818"/>
+            <a:ext cx="12780169" cy="3675963"/>
           </a:xfrm>
           <a:prstGeom prst="rect">
             <a:avLst/>
@@ -4051,15 +4069,15 @@
           </a:fontRef>
         </p:style>
         <p:txBody>
-          <a:bodyPr rtlCol="0" anchor="ctr"/>
-          <a:lstStyle/>
-          <a:p>
-            <a:pPr marL="171450" indent="-171450">
+          <a:bodyPr rtlCol="0" anchor="t" anchorCtr="0"/>
+          <a:lstStyle/>
+          <a:p>
+            <a:pPr marL="718911" indent="-718911">
               <a:buFont typeface="Arial" charset="0"/>
               <a:buChar char="•"/>
             </a:pPr>
             <a:r>
-              <a:rPr lang="en-US" sz="1000" dirty="0" smtClean="0">
+              <a:rPr lang="en-US" sz="3500" dirty="0">
                 <a:solidFill>
                   <a:srgbClr val="335C81"/>
                 </a:solidFill>
@@ -4067,26 +4085,9 @@
                 <a:ea typeface="Helvetica" charset="0"/>
                 <a:cs typeface="Helvetica" charset="0"/>
               </a:rPr>
-              <a:t>Allows users to speak sign language in a mobile environment</a:t>
-            </a:r>
-          </a:p>
-          <a:p>
-            <a:pPr marL="171450" indent="-171450">
-              <a:buFont typeface="Arial" charset="0"/>
-              <a:buChar char="•"/>
-            </a:pPr>
-            <a:r>
-              <a:rPr lang="en-US" sz="1000" dirty="0" smtClean="0">
-                <a:solidFill>
-                  <a:srgbClr val="335C81"/>
-                </a:solidFill>
-                <a:latin typeface="Helvetica" charset="0"/>
-                <a:ea typeface="Helvetica" charset="0"/>
-                <a:cs typeface="Helvetica" charset="0"/>
-              </a:rPr>
-              <a:t>Portable with minimal setup time</a:t>
-            </a:r>
-            <a:endParaRPr lang="en-US" sz="1000" dirty="0">
+              <a:t>Build a system to allow sign-language speakers to communicate with non-speakers in an unobtrusive and natural way</a:t>
+            </a:r>
+            <a:endParaRPr lang="en-US" sz="3500" dirty="0">
               <a:solidFill>
                 <a:srgbClr val="335C81"/>
               </a:solidFill>
@@ -4095,43 +4096,18 @@
               <a:cs typeface="Helvetica" charset="0"/>
             </a:endParaRPr>
           </a:p>
-          <a:p>
-            <a:pPr marL="171450" lvl="0" indent="-171450">
-              <a:buFont typeface="Arial" charset="0"/>
-              <a:buChar char="•"/>
-            </a:pPr>
-            <a:r>
-              <a:rPr lang="en-US" sz="1000" dirty="0" smtClean="0">
-                <a:solidFill>
-                  <a:srgbClr val="335C81"/>
-                </a:solidFill>
-                <a:latin typeface="Helvetica" charset="0"/>
-                <a:ea typeface="Helvetica" charset="0"/>
-                <a:cs typeface="Helvetica" charset="0"/>
-              </a:rPr>
-              <a:t>Easily integrated into daily routine</a:t>
-            </a:r>
-            <a:endParaRPr lang="en-US" sz="1000" dirty="0">
-              <a:solidFill>
-                <a:srgbClr val="335C81"/>
-              </a:solidFill>
-              <a:latin typeface="Helvetica" charset="0"/>
-              <a:ea typeface="Helvetica" charset="0"/>
-              <a:cs typeface="Helvetica" charset="0"/>
-            </a:endParaRPr>
-          </a:p>
-        </p:txBody>
-      </p:sp>
-      <p:sp>
-        <p:nvSpPr>
-          <p:cNvPr id="37" name="Rectangle 36"/>
+        </p:txBody>
+      </p:sp>
+      <p:sp>
+        <p:nvSpPr>
+          <p:cNvPr id="41" name="Rectangle 40"/>
           <p:cNvSpPr/>
           <p:nvPr/>
         </p:nvSpPr>
         <p:spPr>
           <a:xfrm>
-            <a:off x="3962401" y="4261092"/>
-            <a:ext cx="4199466" cy="1490133"/>
+            <a:off x="2241194" y="23468450"/>
+            <a:ext cx="12780169" cy="6248081"/>
           </a:xfrm>
           <a:prstGeom prst="rect">
             <a:avLst/>
@@ -4160,19 +4136,19 @@
           </a:fontRef>
         </p:style>
         <p:txBody>
-          <a:bodyPr tIns="108000" rtlCol="0" anchor="t" anchorCtr="0"/>
+          <a:bodyPr rtlCol="0" anchor="t" anchorCtr="0"/>
           <a:lstStyle/>
           <a:p>
             <a:pPr algn="ctr"/>
             <a:r>
-              <a:rPr lang="en-US" sz="1600" dirty="0" smtClean="0">
+              <a:rPr lang="en-US" sz="7500" dirty="0">
                 <a:latin typeface="Helvetica" charset="0"/>
                 <a:ea typeface="Helvetica" charset="0"/>
                 <a:cs typeface="Helvetica" charset="0"/>
               </a:rPr>
-              <a:t>Analysis Results</a:t>
-            </a:r>
-            <a:endParaRPr lang="en-US" sz="1600" dirty="0">
+              <a:t>Design Considerations</a:t>
+            </a:r>
+            <a:endParaRPr lang="en-US" sz="7500" dirty="0">
               <a:latin typeface="Helvetica" charset="0"/>
               <a:ea typeface="Helvetica" charset="0"/>
               <a:cs typeface="Helvetica" charset="0"/>
@@ -4182,14 +4158,14 @@
       </p:sp>
       <p:sp>
         <p:nvSpPr>
-          <p:cNvPr id="38" name="Rectangle 37"/>
+          <p:cNvPr id="42" name="Rectangle 41"/>
           <p:cNvSpPr/>
           <p:nvPr/>
         </p:nvSpPr>
         <p:spPr>
           <a:xfrm>
-            <a:off x="3962401" y="4769092"/>
-            <a:ext cx="4199466" cy="1773259"/>
+            <a:off x="2240349" y="25293676"/>
+            <a:ext cx="12780169" cy="5354773"/>
           </a:xfrm>
           <a:prstGeom prst="rect">
             <a:avLst/>
@@ -4218,24 +4194,48 @@
           </a:fontRef>
         </p:style>
         <p:txBody>
-          <a:bodyPr rtlCol="0" anchor="ctr"/>
+          <a:bodyPr rtlCol="0" anchor="t" anchorCtr="0"/>
           <a:lstStyle/>
           <a:p>
             <a:pPr algn="ctr"/>
-            <a:endParaRPr lang="en-US"/>
-          </a:p>
-        </p:txBody>
-      </p:sp>
-      <p:sp>
-        <p:nvSpPr>
-          <p:cNvPr id="39" name="Rectangle 38"/>
+            <a:endParaRPr lang="en-US" sz="3500"/>
+          </a:p>
+        </p:txBody>
+      </p:sp>
+      <p:pic>
+        <p:nvPicPr>
+          <p:cNvPr id="4" name="Picture 3"/>
+          <p:cNvPicPr>
+            <a:picLocks noChangeAspect="1"/>
+          </p:cNvPicPr>
+          <p:nvPr/>
+        </p:nvPicPr>
+        <p:blipFill>
+          <a:blip r:embed="rId3"/>
+          <a:stretch>
+            <a:fillRect/>
+          </a:stretch>
+        </p:blipFill>
+        <p:spPr>
+          <a:xfrm flipH="1">
+            <a:off x="36967885" y="1830204"/>
+            <a:ext cx="2768271" cy="2768271"/>
+          </a:xfrm>
+          <a:prstGeom prst="rect">
+            <a:avLst/>
+          </a:prstGeom>
+        </p:spPr>
+      </p:pic>
+      <p:sp>
+        <p:nvSpPr>
+          <p:cNvPr id="22" name="Rectangle 21"/>
           <p:cNvSpPr/>
           <p:nvPr/>
         </p:nvSpPr>
         <p:spPr>
           <a:xfrm>
-            <a:off x="592667" y="4983856"/>
-            <a:ext cx="3048000" cy="1490133"/>
+            <a:off x="35920288" y="22537356"/>
+            <a:ext cx="12780169" cy="4907941"/>
           </a:xfrm>
           <a:prstGeom prst="rect">
             <a:avLst/>
@@ -4269,14 +4269,14 @@
           <a:p>
             <a:pPr algn="ctr"/>
             <a:r>
-              <a:rPr lang="en-US" sz="1500" dirty="0" smtClean="0">
+              <a:rPr lang="en-US" sz="7500" dirty="0">
                 <a:latin typeface="Helvetica" charset="0"/>
                 <a:ea typeface="Helvetica" charset="0"/>
                 <a:cs typeface="Helvetica" charset="0"/>
               </a:rPr>
-              <a:t>Acknowledgements</a:t>
-            </a:r>
-            <a:endParaRPr lang="en-US" sz="1500" dirty="0">
+              <a:t>Advantages</a:t>
+            </a:r>
+            <a:endParaRPr lang="en-US" sz="7500" dirty="0">
               <a:latin typeface="Helvetica" charset="0"/>
               <a:ea typeface="Helvetica" charset="0"/>
               <a:cs typeface="Helvetica" charset="0"/>
@@ -4286,14 +4286,14 @@
       </p:sp>
       <p:sp>
         <p:nvSpPr>
-          <p:cNvPr id="40" name="Rectangle 39"/>
+          <p:cNvPr id="23" name="Rectangle 22"/>
           <p:cNvSpPr/>
           <p:nvPr/>
         </p:nvSpPr>
         <p:spPr>
           <a:xfrm>
-            <a:off x="592667" y="5299023"/>
-            <a:ext cx="3048000" cy="1261628"/>
+            <a:off x="35921133" y="24314303"/>
+            <a:ext cx="12780169" cy="3675963"/>
           </a:xfrm>
           <a:prstGeom prst="rect">
             <a:avLst/>
@@ -4322,15 +4322,15 @@
           </a:fontRef>
         </p:style>
         <p:txBody>
-          <a:bodyPr tIns="144000" rtlCol="0" anchor="t" anchorCtr="0"/>
-          <a:lstStyle/>
-          <a:p>
-            <a:pPr marL="285750" indent="-285750">
+          <a:bodyPr rtlCol="0" anchor="t" anchorCtr="0"/>
+          <a:lstStyle/>
+          <a:p>
+            <a:pPr marL="718911" indent="-718911">
               <a:buFont typeface="Arial" charset="0"/>
               <a:buChar char="•"/>
             </a:pPr>
             <a:r>
-              <a:rPr lang="en-US" sz="1000" dirty="0" smtClean="0">
+              <a:rPr lang="en-US" sz="3500" dirty="0">
                 <a:solidFill>
                   <a:srgbClr val="335C81"/>
                 </a:solidFill>
@@ -4338,10 +4338,16 @@
                 <a:ea typeface="Helvetica" charset="0"/>
                 <a:cs typeface="Helvetica" charset="0"/>
               </a:rPr>
-              <a:t>Consultant: Dana </a:t>
-            </a:r>
-            <a:r>
-              <a:rPr lang="en-US" sz="1000" dirty="0" err="1" smtClean="0">
+              <a:t>Allows users to speak sign language in a mobile environment</a:t>
+            </a:r>
+          </a:p>
+          <a:p>
+            <a:pPr marL="718911" indent="-718911">
+              <a:buFont typeface="Arial" charset="0"/>
+              <a:buChar char="•"/>
+            </a:pPr>
+            <a:r>
+              <a:rPr lang="en-US" sz="3500" dirty="0">
                 <a:solidFill>
                   <a:srgbClr val="335C81"/>
                 </a:solidFill>
@@ -4349,9 +4355,26 @@
                 <a:ea typeface="Helvetica" charset="0"/>
                 <a:cs typeface="Helvetica" charset="0"/>
               </a:rPr>
-              <a:t>Kulic</a:t>
-            </a:r>
-            <a:endParaRPr lang="en-US" sz="1000" dirty="0" smtClean="0">
+              <a:t>Portable with minimal setup time</a:t>
+            </a:r>
+          </a:p>
+          <a:p>
+            <a:pPr marL="718911" indent="-718911">
+              <a:buFont typeface="Arial" charset="0"/>
+              <a:buChar char="•"/>
+            </a:pPr>
+            <a:r>
+              <a:rPr lang="en-US" sz="3500" dirty="0">
+                <a:solidFill>
+                  <a:srgbClr val="335C81"/>
+                </a:solidFill>
+                <a:latin typeface="Helvetica" charset="0"/>
+                <a:ea typeface="Helvetica" charset="0"/>
+                <a:cs typeface="Helvetica" charset="0"/>
+              </a:rPr>
+              <a:t>Easily integrated into daily routine</a:t>
+            </a:r>
+            <a:endParaRPr lang="en-US" sz="3500" dirty="0">
               <a:solidFill>
                 <a:srgbClr val="335C81"/>
               </a:solidFill>
@@ -4360,104 +4383,18 @@
               <a:cs typeface="Helvetica" charset="0"/>
             </a:endParaRPr>
           </a:p>
-          <a:p>
-            <a:pPr marL="285750" indent="-285750">
-              <a:buFont typeface="Arial" charset="0"/>
-              <a:buChar char="•"/>
-            </a:pPr>
-            <a:r>
-              <a:rPr lang="en-US" sz="1000" dirty="0" smtClean="0">
-                <a:solidFill>
-                  <a:srgbClr val="335C81"/>
-                </a:solidFill>
-                <a:latin typeface="Helvetica" charset="0"/>
-                <a:ea typeface="Helvetica" charset="0"/>
-                <a:cs typeface="Helvetica" charset="0"/>
-              </a:rPr>
-              <a:t>Course Coordinator: Dan Davison</a:t>
-            </a:r>
-          </a:p>
-          <a:p>
-            <a:pPr marL="285750" indent="-285750">
-              <a:buFont typeface="Arial" charset="0"/>
-              <a:buChar char="•"/>
-            </a:pPr>
-            <a:r>
-              <a:rPr lang="en-US" sz="1000" dirty="0" smtClean="0">
-                <a:solidFill>
-                  <a:srgbClr val="335C81"/>
-                </a:solidFill>
-                <a:latin typeface="Helvetica" charset="0"/>
-                <a:ea typeface="Helvetica" charset="0"/>
-                <a:cs typeface="Helvetica" charset="0"/>
-              </a:rPr>
-              <a:t>Group Members: </a:t>
-            </a:r>
-            <a:r>
-              <a:rPr lang="en-US" sz="1000" dirty="0" err="1" smtClean="0">
-                <a:solidFill>
-                  <a:srgbClr val="335C81"/>
-                </a:solidFill>
-                <a:latin typeface="Helvetica" charset="0"/>
-                <a:ea typeface="Helvetica" charset="0"/>
-                <a:cs typeface="Helvetica" charset="0"/>
-              </a:rPr>
-              <a:t>Akshay</a:t>
-            </a:r>
-            <a:r>
-              <a:rPr lang="en-US" sz="1000" dirty="0" smtClean="0">
-                <a:solidFill>
-                  <a:srgbClr val="335C81"/>
-                </a:solidFill>
-                <a:latin typeface="Helvetica" charset="0"/>
-                <a:ea typeface="Helvetica" charset="0"/>
-                <a:cs typeface="Helvetica" charset="0"/>
-              </a:rPr>
-              <a:t> </a:t>
-            </a:r>
-            <a:r>
-              <a:rPr lang="en-US" sz="1000" dirty="0" err="1" smtClean="0">
-                <a:solidFill>
-                  <a:srgbClr val="335C81"/>
-                </a:solidFill>
-                <a:latin typeface="Helvetica" charset="0"/>
-                <a:ea typeface="Helvetica" charset="0"/>
-                <a:cs typeface="Helvetica" charset="0"/>
-              </a:rPr>
-              <a:t>Budhkar</a:t>
-            </a:r>
-            <a:r>
-              <a:rPr lang="en-US" sz="1000" dirty="0" smtClean="0">
-                <a:solidFill>
-                  <a:srgbClr val="335C81"/>
-                </a:solidFill>
-                <a:latin typeface="Helvetica" charset="0"/>
-                <a:ea typeface="Helvetica" charset="0"/>
-                <a:cs typeface="Helvetica" charset="0"/>
-              </a:rPr>
-              <a:t>, Eliot Chan, Biraj Kapadia, Amish Patel</a:t>
-            </a:r>
-            <a:endParaRPr lang="en-US" sz="1000" dirty="0">
-              <a:solidFill>
-                <a:srgbClr val="335C81"/>
-              </a:solidFill>
-              <a:latin typeface="Helvetica" charset="0"/>
-              <a:ea typeface="Helvetica" charset="0"/>
-              <a:cs typeface="Helvetica" charset="0"/>
-            </a:endParaRPr>
-          </a:p>
-        </p:txBody>
-      </p:sp>
-      <p:sp>
-        <p:nvSpPr>
-          <p:cNvPr id="41" name="Rectangle 40"/>
+        </p:txBody>
+      </p:sp>
+      <p:sp>
+        <p:nvSpPr>
+          <p:cNvPr id="28" name="Rectangle 27"/>
           <p:cNvSpPr/>
           <p:nvPr/>
         </p:nvSpPr>
         <p:spPr>
           <a:xfrm>
-            <a:off x="592667" y="3217592"/>
-            <a:ext cx="3048000" cy="1490133"/>
+            <a:off x="16614227" y="23468451"/>
+            <a:ext cx="17608230" cy="6248081"/>
           </a:xfrm>
           <a:prstGeom prst="rect">
             <a:avLst/>
@@ -4486,19 +4423,19 @@
           </a:fontRef>
         </p:style>
         <p:txBody>
-          <a:bodyPr rtlCol="0" anchor="t" anchorCtr="0"/>
+          <a:bodyPr tIns="46800" rtlCol="0" anchor="t" anchorCtr="0"/>
           <a:lstStyle/>
           <a:p>
             <a:pPr algn="ctr"/>
             <a:r>
-              <a:rPr lang="en-US" sz="1500" dirty="0" smtClean="0">
+              <a:rPr lang="en-US" sz="7500" dirty="0">
                 <a:latin typeface="Helvetica" charset="0"/>
                 <a:ea typeface="Helvetica" charset="0"/>
                 <a:cs typeface="Helvetica" charset="0"/>
               </a:rPr>
-              <a:t>Design Considerations</a:t>
-            </a:r>
-            <a:endParaRPr lang="en-US" sz="1500" dirty="0">
+              <a:t>Principle of Operation</a:t>
+            </a:r>
+            <a:endParaRPr lang="en-US" sz="7500" dirty="0">
               <a:latin typeface="Helvetica" charset="0"/>
               <a:ea typeface="Helvetica" charset="0"/>
               <a:cs typeface="Helvetica" charset="0"/>
@@ -4508,14 +4445,14 @@
       </p:sp>
       <p:sp>
         <p:nvSpPr>
-          <p:cNvPr id="42" name="Rectangle 41"/>
+          <p:cNvPr id="29" name="Rectangle 28"/>
           <p:cNvSpPr/>
           <p:nvPr/>
         </p:nvSpPr>
         <p:spPr>
           <a:xfrm>
-            <a:off x="592667" y="3549188"/>
-            <a:ext cx="3048000" cy="1277084"/>
+            <a:off x="16614227" y="25293677"/>
+            <a:ext cx="17608230" cy="11759482"/>
           </a:xfrm>
           <a:prstGeom prst="rect">
             <a:avLst/>
@@ -4544,38 +4481,274 @@
           </a:fontRef>
         </p:style>
         <p:txBody>
-          <a:bodyPr rtlCol="0" anchor="ctr"/>
-          <a:lstStyle/>
-          <a:p>
-            <a:pPr algn="ctr"/>
-            <a:endParaRPr lang="en-US"/>
-          </a:p>
-        </p:txBody>
-      </p:sp>
-      <p:pic>
-        <p:nvPicPr>
-          <p:cNvPr id="4" name="Picture 3"/>
-          <p:cNvPicPr>
-            <a:picLocks noChangeAspect="1"/>
-          </p:cNvPicPr>
+          <a:bodyPr rtlCol="0" anchor="t" anchorCtr="0"/>
+          <a:lstStyle/>
+          <a:p>
+            <a:pPr marL="1198179" indent="-1198179">
+              <a:buFont typeface="Arial" charset="0"/>
+              <a:buChar char="•"/>
+            </a:pPr>
+            <a:endParaRPr lang="en-US" sz="3500" dirty="0">
+              <a:solidFill>
+                <a:srgbClr val="335C81"/>
+              </a:solidFill>
+              <a:latin typeface="Helvetica" charset="0"/>
+              <a:ea typeface="Helvetica" charset="0"/>
+              <a:cs typeface="Helvetica" charset="0"/>
+            </a:endParaRPr>
+          </a:p>
+        </p:txBody>
+      </p:sp>
+      <p:sp>
+        <p:nvSpPr>
+          <p:cNvPr id="30" name="Rectangle 29"/>
+          <p:cNvSpPr/>
           <p:nvPr/>
-        </p:nvPicPr>
-        <p:blipFill>
-          <a:blip r:embed="rId3"/>
-          <a:stretch>
-            <a:fillRect/>
-          </a:stretch>
-        </p:blipFill>
+        </p:nvSpPr>
         <p:spPr>
-          <a:xfrm flipH="1">
-            <a:off x="9499601" y="268941"/>
-            <a:ext cx="460144" cy="460144"/>
+          <a:xfrm>
+            <a:off x="2135382" y="31727345"/>
+            <a:ext cx="12780169" cy="5325814"/>
           </a:xfrm>
           <a:prstGeom prst="rect">
             <a:avLst/>
           </a:prstGeom>
+          <a:solidFill>
+            <a:srgbClr val="68C5DB"/>
+          </a:solidFill>
+          <a:ln>
+            <a:noFill/>
+          </a:ln>
         </p:spPr>
-      </p:pic>
+        <p:style>
+          <a:lnRef idx="2">
+            <a:schemeClr val="accent1">
+              <a:shade val="50000"/>
+            </a:schemeClr>
+          </a:lnRef>
+          <a:fillRef idx="1">
+            <a:schemeClr val="accent1"/>
+          </a:fillRef>
+          <a:effectRef idx="0">
+            <a:schemeClr val="accent1"/>
+          </a:effectRef>
+          <a:fontRef idx="minor">
+            <a:schemeClr val="lt1"/>
+          </a:fontRef>
+        </p:style>
+        <p:txBody>
+          <a:bodyPr rtlCol="0" anchor="t" anchorCtr="0"/>
+          <a:lstStyle/>
+          <a:p>
+            <a:pPr algn="ctr"/>
+            <a:r>
+              <a:rPr lang="en-US" sz="7500" dirty="0">
+                <a:latin typeface="Helvetica" charset="0"/>
+                <a:ea typeface="Helvetica" charset="0"/>
+                <a:cs typeface="Helvetica" charset="0"/>
+              </a:rPr>
+              <a:t>Acknowledgements</a:t>
+            </a:r>
+            <a:endParaRPr lang="en-US" sz="7500" dirty="0">
+              <a:latin typeface="Helvetica" charset="0"/>
+              <a:ea typeface="Helvetica" charset="0"/>
+              <a:cs typeface="Helvetica" charset="0"/>
+            </a:endParaRPr>
+          </a:p>
+        </p:txBody>
+      </p:sp>
+      <p:sp>
+        <p:nvSpPr>
+          <p:cNvPr id="35" name="Rectangle 34"/>
+          <p:cNvSpPr/>
+          <p:nvPr/>
+        </p:nvSpPr>
+        <p:spPr>
+          <a:xfrm>
+            <a:off x="2132549" y="33552571"/>
+            <a:ext cx="12780169" cy="3500588"/>
+          </a:xfrm>
+          <a:prstGeom prst="rect">
+            <a:avLst/>
+          </a:prstGeom>
+          <a:solidFill>
+            <a:srgbClr val="DCFFFD"/>
+          </a:solidFill>
+          <a:ln>
+            <a:noFill/>
+          </a:ln>
+        </p:spPr>
+        <p:style>
+          <a:lnRef idx="2">
+            <a:schemeClr val="accent1">
+              <a:shade val="50000"/>
+            </a:schemeClr>
+          </a:lnRef>
+          <a:fillRef idx="1">
+            <a:schemeClr val="accent1"/>
+          </a:fillRef>
+          <a:effectRef idx="0">
+            <a:schemeClr val="accent1"/>
+          </a:effectRef>
+          <a:fontRef idx="minor">
+            <a:schemeClr val="lt1"/>
+          </a:fontRef>
+        </p:style>
+        <p:txBody>
+          <a:bodyPr rtlCol="0" anchor="t" anchorCtr="0"/>
+          <a:lstStyle/>
+          <a:p>
+            <a:pPr marL="1198179" indent="-1198179">
+              <a:buFont typeface="Arial" charset="0"/>
+              <a:buChar char="•"/>
+            </a:pPr>
+            <a:r>
+              <a:rPr lang="en-US" sz="3500" dirty="0" smtClean="0">
+                <a:solidFill>
+                  <a:srgbClr val="335C81"/>
+                </a:solidFill>
+                <a:latin typeface="Helvetica" charset="0"/>
+                <a:ea typeface="Helvetica" charset="0"/>
+                <a:cs typeface="Helvetica" charset="0"/>
+              </a:rPr>
+              <a:t>Group </a:t>
+            </a:r>
+            <a:r>
+              <a:rPr lang="en-US" sz="3500" dirty="0">
+                <a:solidFill>
+                  <a:srgbClr val="335C81"/>
+                </a:solidFill>
+                <a:latin typeface="Helvetica" charset="0"/>
+                <a:ea typeface="Helvetica" charset="0"/>
+                <a:cs typeface="Helvetica" charset="0"/>
+              </a:rPr>
+              <a:t>Members: </a:t>
+            </a:r>
+            <a:r>
+              <a:rPr lang="en-US" sz="3500" dirty="0" err="1">
+                <a:solidFill>
+                  <a:srgbClr val="335C81"/>
+                </a:solidFill>
+                <a:latin typeface="Helvetica" charset="0"/>
+                <a:ea typeface="Helvetica" charset="0"/>
+                <a:cs typeface="Helvetica" charset="0"/>
+              </a:rPr>
+              <a:t>Akshay</a:t>
+            </a:r>
+            <a:r>
+              <a:rPr lang="en-US" sz="3500" dirty="0">
+                <a:solidFill>
+                  <a:srgbClr val="335C81"/>
+                </a:solidFill>
+                <a:latin typeface="Helvetica" charset="0"/>
+                <a:ea typeface="Helvetica" charset="0"/>
+                <a:cs typeface="Helvetica" charset="0"/>
+              </a:rPr>
+              <a:t> </a:t>
+            </a:r>
+            <a:r>
+              <a:rPr lang="en-US" sz="3500" dirty="0" err="1">
+                <a:solidFill>
+                  <a:srgbClr val="335C81"/>
+                </a:solidFill>
+                <a:latin typeface="Helvetica" charset="0"/>
+                <a:ea typeface="Helvetica" charset="0"/>
+                <a:cs typeface="Helvetica" charset="0"/>
+              </a:rPr>
+              <a:t>Budhkar</a:t>
+            </a:r>
+            <a:r>
+              <a:rPr lang="en-US" sz="3500" dirty="0">
+                <a:solidFill>
+                  <a:srgbClr val="335C81"/>
+                </a:solidFill>
+                <a:latin typeface="Helvetica" charset="0"/>
+                <a:ea typeface="Helvetica" charset="0"/>
+                <a:cs typeface="Helvetica" charset="0"/>
+              </a:rPr>
+              <a:t>, Eliot Chan, Biraj Kapadia, Amish </a:t>
+            </a:r>
+            <a:r>
+              <a:rPr lang="en-US" sz="3500" dirty="0" smtClean="0">
+                <a:solidFill>
+                  <a:srgbClr val="335C81"/>
+                </a:solidFill>
+                <a:latin typeface="Helvetica" charset="0"/>
+                <a:ea typeface="Helvetica" charset="0"/>
+                <a:cs typeface="Helvetica" charset="0"/>
+              </a:rPr>
+              <a:t>Patel</a:t>
+            </a:r>
+          </a:p>
+          <a:p>
+            <a:pPr marL="1198179" indent="-1198179">
+              <a:buFont typeface="Arial" charset="0"/>
+              <a:buChar char="•"/>
+            </a:pPr>
+            <a:r>
+              <a:rPr lang="en-US" sz="3500" dirty="0">
+                <a:solidFill>
+                  <a:srgbClr val="335C81"/>
+                </a:solidFill>
+                <a:latin typeface="Helvetica" charset="0"/>
+                <a:ea typeface="Helvetica" charset="0"/>
+                <a:cs typeface="Helvetica" charset="0"/>
+              </a:rPr>
+              <a:t>Consultant: Dana </a:t>
+            </a:r>
+            <a:r>
+              <a:rPr lang="en-US" sz="3500" dirty="0" err="1">
+                <a:solidFill>
+                  <a:srgbClr val="335C81"/>
+                </a:solidFill>
+                <a:latin typeface="Helvetica" charset="0"/>
+                <a:ea typeface="Helvetica" charset="0"/>
+                <a:cs typeface="Helvetica" charset="0"/>
+              </a:rPr>
+              <a:t>Kulic</a:t>
+            </a:r>
+            <a:endParaRPr lang="en-US" sz="3500" dirty="0">
+              <a:solidFill>
+                <a:srgbClr val="335C81"/>
+              </a:solidFill>
+              <a:latin typeface="Helvetica" charset="0"/>
+              <a:ea typeface="Helvetica" charset="0"/>
+              <a:cs typeface="Helvetica" charset="0"/>
+            </a:endParaRPr>
+          </a:p>
+          <a:p>
+            <a:pPr marL="1198179" indent="-1198179">
+              <a:buFont typeface="Arial" charset="0"/>
+              <a:buChar char="•"/>
+            </a:pPr>
+            <a:r>
+              <a:rPr lang="en-US" sz="3500" dirty="0">
+                <a:solidFill>
+                  <a:srgbClr val="335C81"/>
+                </a:solidFill>
+                <a:latin typeface="Helvetica" charset="0"/>
+                <a:ea typeface="Helvetica" charset="0"/>
+                <a:cs typeface="Helvetica" charset="0"/>
+              </a:rPr>
+              <a:t>Course Coordinator: Dan Davison</a:t>
+            </a:r>
+          </a:p>
+          <a:p>
+            <a:pPr marL="1198179" indent="-1198179">
+              <a:buFont typeface="Arial" charset="0"/>
+              <a:buChar char="•"/>
+            </a:pPr>
+            <a:endParaRPr lang="en-US" sz="3500" dirty="0">
+              <a:solidFill>
+                <a:srgbClr val="335C81"/>
+              </a:solidFill>
+              <a:latin typeface="Helvetica" charset="0"/>
+              <a:ea typeface="Helvetica" charset="0"/>
+              <a:cs typeface="Helvetica" charset="0"/>
+            </a:endParaRPr>
+          </a:p>
+        </p:txBody>
+      </p:sp>
     </p:spTree>
     <p:extLst>
       <p:ext uri="{BB962C8B-B14F-4D97-AF65-F5344CB8AC3E}">
@@ -4599,7 +4772,7 @@
 <file path=ppt/theme/theme1.xml><?xml version="1.0" encoding="utf-8"?>
 <a:theme xmlns:a="http://schemas.openxmlformats.org/drawingml/2006/main" name="Office Theme">
   <a:themeElements>
-    <a:clrScheme name="Office">
+    <a:clrScheme name="Office Theme">
       <a:dk1>
         <a:sysClr val="windowText" lastClr="000000"/>
       </a:dk1>
@@ -4637,14 +4810,14 @@
         <a:srgbClr val="954F72"/>
       </a:folHlink>
     </a:clrScheme>
-    <a:fontScheme name="Office">
+    <a:fontScheme name="Office Theme">
       <a:majorFont>
         <a:latin typeface="Calibri Light" panose="020F0302020204030204"/>
         <a:ea typeface=""/>
         <a:cs typeface=""/>
-        <a:font script="Jpan" typeface="Yu Gothic Light"/>
+        <a:font script="Jpan" typeface="ＭＳ Ｐゴシック"/>
         <a:font script="Hang" typeface="맑은 고딕"/>
-        <a:font script="Hans" typeface="DengXian Light"/>
+        <a:font script="Hans" typeface="宋体"/>
         <a:font script="Hant" typeface="新細明體"/>
         <a:font script="Arab" typeface="Times New Roman"/>
         <a:font script="Hebr" typeface="Times New Roman"/>
@@ -4677,9 +4850,9 @@
         <a:latin typeface="Calibri" panose="020F0502020204030204"/>
         <a:ea typeface=""/>
         <a:cs typeface=""/>
-        <a:font script="Jpan" typeface="Yu Gothic"/>
+        <a:font script="Jpan" typeface="ＭＳ Ｐゴシック"/>
         <a:font script="Hang" typeface="맑은 고딕"/>
-        <a:font script="Hans" typeface="DengXian"/>
+        <a:font script="Hans" typeface="宋体"/>
         <a:font script="Hant" typeface="新細明體"/>
         <a:font script="Arab" typeface="Arial"/>
         <a:font script="Hebr" typeface="Arial"/>
@@ -4709,7 +4882,7 @@
         <a:font script="Geor" typeface="Sylfaen"/>
       </a:minorFont>
     </a:fontScheme>
-    <a:fmtScheme name="Office">
+    <a:fmtScheme name="Office Theme">
       <a:fillStyleLst>
         <a:solidFill>
           <a:schemeClr val="phClr"/>

</xml_diff>